<commit_message>
add case study to the slide
</commit_message>
<xml_diff>
--- a/slides/presentation2.pptx
+++ b/slides/presentation2.pptx
@@ -27,6 +27,9 @@
     <p:sldId id="270" r:id="rId20"/>
     <p:sldId id="271" r:id="rId21"/>
     <p:sldId id="272" r:id="rId22"/>
+    <p:sldId id="273" r:id="rId23"/>
+    <p:sldId id="274" r:id="rId24"/>
+    <p:sldId id="275" r:id="rId25"/>
   </p:sldIdLst>
   <p:sldSz cx="12192000" cy="6858000"/>
   <p:notesSz cx="6858000" cy="9144000"/>
@@ -202,7 +205,7 @@
           <a:bodyPr lIns="0" rIns="0" tIns="0" bIns="0" anchor="b"/>
           <a:p>
             <a:pPr algn="r"/>
-            <a:fld id="{D961120B-F84E-4962-882D-F07C4777358C}" type="slidenum">
+            <a:fld id="{D3A3530E-416B-4142-96FD-F13A8DDCD1BD}" type="slidenum">
               <a:rPr lang="en-US" sz="1400">
                 <a:latin typeface="Times New Roman"/>
               </a:rPr>
@@ -237,7 +240,7 @@
       </p:grpSpPr>
       <p:sp>
         <p:nvSpPr>
-          <p:cNvPr id="423" name="PlaceHolder 1"/>
+          <p:cNvPr id="484" name="PlaceHolder 1"/>
           <p:cNvSpPr>
             <a:spLocks noGrp="1"/>
           </p:cNvSpPr>
@@ -263,7 +266,7 @@
       </p:sp>
       <p:sp>
         <p:nvSpPr>
-          <p:cNvPr id="424" name="TextShape 2"/>
+          <p:cNvPr id="485" name="TextShape 2"/>
           <p:cNvSpPr txBox="1"/>
           <p:nvPr/>
         </p:nvSpPr>
@@ -311,7 +314,7 @@
       </p:grpSpPr>
       <p:sp>
         <p:nvSpPr>
-          <p:cNvPr id="425" name="PlaceHolder 1"/>
+          <p:cNvPr id="486" name="PlaceHolder 1"/>
           <p:cNvSpPr>
             <a:spLocks noGrp="1"/>
           </p:cNvSpPr>
@@ -337,7 +340,7 @@
       </p:sp>
       <p:sp>
         <p:nvSpPr>
-          <p:cNvPr id="426" name="TextShape 2"/>
+          <p:cNvPr id="487" name="TextShape 2"/>
           <p:cNvSpPr txBox="1"/>
           <p:nvPr/>
         </p:nvSpPr>
@@ -385,7 +388,7 @@
       </p:grpSpPr>
       <p:sp>
         <p:nvSpPr>
-          <p:cNvPr id="427" name="PlaceHolder 1"/>
+          <p:cNvPr id="488" name="PlaceHolder 1"/>
           <p:cNvSpPr>
             <a:spLocks noGrp="1"/>
           </p:cNvSpPr>
@@ -411,7 +414,7 @@
       </p:sp>
       <p:sp>
         <p:nvSpPr>
-          <p:cNvPr id="428" name="TextShape 2"/>
+          <p:cNvPr id="489" name="TextShape 2"/>
           <p:cNvSpPr txBox="1"/>
           <p:nvPr/>
         </p:nvSpPr>
@@ -459,7 +462,7 @@
       </p:grpSpPr>
       <p:sp>
         <p:nvSpPr>
-          <p:cNvPr id="429" name="PlaceHolder 1"/>
+          <p:cNvPr id="490" name="PlaceHolder 1"/>
           <p:cNvSpPr>
             <a:spLocks noGrp="1"/>
           </p:cNvSpPr>
@@ -485,7 +488,7 @@
       </p:sp>
       <p:sp>
         <p:nvSpPr>
-          <p:cNvPr id="430" name="TextShape 2"/>
+          <p:cNvPr id="491" name="TextShape 2"/>
           <p:cNvSpPr txBox="1"/>
           <p:nvPr/>
         </p:nvSpPr>
@@ -533,7 +536,7 @@
       </p:grpSpPr>
       <p:sp>
         <p:nvSpPr>
-          <p:cNvPr id="431" name="PlaceHolder 1"/>
+          <p:cNvPr id="492" name="PlaceHolder 1"/>
           <p:cNvSpPr>
             <a:spLocks noGrp="1"/>
           </p:cNvSpPr>
@@ -559,7 +562,7 @@
       </p:sp>
       <p:sp>
         <p:nvSpPr>
-          <p:cNvPr id="432" name="TextShape 2"/>
+          <p:cNvPr id="493" name="TextShape 2"/>
           <p:cNvSpPr txBox="1"/>
           <p:nvPr/>
         </p:nvSpPr>
@@ -607,7 +610,7 @@
       </p:grpSpPr>
       <p:sp>
         <p:nvSpPr>
-          <p:cNvPr id="433" name="PlaceHolder 1"/>
+          <p:cNvPr id="494" name="PlaceHolder 1"/>
           <p:cNvSpPr>
             <a:spLocks noGrp="1"/>
           </p:cNvSpPr>
@@ -633,7 +636,7 @@
       </p:sp>
       <p:sp>
         <p:nvSpPr>
-          <p:cNvPr id="434" name="TextShape 2"/>
+          <p:cNvPr id="495" name="TextShape 2"/>
           <p:cNvSpPr txBox="1"/>
           <p:nvPr/>
         </p:nvSpPr>
@@ -681,7 +684,7 @@
       </p:grpSpPr>
       <p:sp>
         <p:nvSpPr>
-          <p:cNvPr id="435" name="PlaceHolder 1"/>
+          <p:cNvPr id="496" name="PlaceHolder 1"/>
           <p:cNvSpPr>
             <a:spLocks noGrp="1"/>
           </p:cNvSpPr>
@@ -707,7 +710,7 @@
       </p:sp>
       <p:sp>
         <p:nvSpPr>
-          <p:cNvPr id="436" name="TextShape 2"/>
+          <p:cNvPr id="497" name="TextShape 2"/>
           <p:cNvSpPr txBox="1"/>
           <p:nvPr/>
         </p:nvSpPr>
@@ -755,7 +758,7 @@
       </p:grpSpPr>
       <p:sp>
         <p:nvSpPr>
-          <p:cNvPr id="437" name="PlaceHolder 1"/>
+          <p:cNvPr id="498" name="PlaceHolder 1"/>
           <p:cNvSpPr>
             <a:spLocks noGrp="1"/>
           </p:cNvSpPr>
@@ -781,7 +784,155 @@
       </p:sp>
       <p:sp>
         <p:nvSpPr>
-          <p:cNvPr id="438" name="TextShape 2"/>
+          <p:cNvPr id="499" name="TextShape 2"/>
+          <p:cNvSpPr txBox="1"/>
+          <p:nvPr/>
+        </p:nvSpPr>
+        <p:spPr>
+          <a:xfrm>
+            <a:off x="3884760" y="8685360"/>
+            <a:ext cx="2971440" cy="458280"/>
+          </a:xfrm>
+          <a:prstGeom prst="rect">
+            <a:avLst/>
+          </a:prstGeom>
+          <a:noFill/>
+          <a:ln>
+            <a:noFill/>
+          </a:ln>
+        </p:spPr>
+        <p:txBody>
+          <a:bodyPr anchor="b"/>
+          <a:p>
+            <a:endParaRPr/>
+          </a:p>
+        </p:txBody>
+      </p:sp>
+    </p:spTree>
+  </p:cSld>
+</p:notes>
+</file>
+
+<file path=ppt/notesSlides/notesSlide18.xml><?xml version="1.0" encoding="utf-8"?>
+<p:notes xmlns:a="http://schemas.openxmlformats.org/drawingml/2006/main" xmlns:p="http://schemas.openxmlformats.org/presentationml/2006/main" xmlns:r="http://schemas.openxmlformats.org/officeDocument/2006/relationships">
+  <p:cSld>
+    <p:spTree>
+      <p:nvGrpSpPr>
+        <p:cNvPr id="1" name=""/>
+        <p:cNvGrpSpPr/>
+        <p:nvPr/>
+      </p:nvGrpSpPr>
+      <p:grpSpPr>
+        <a:xfrm>
+          <a:off x="0" y="0"/>
+          <a:ext cx="0" cy="0"/>
+          <a:chOff x="0" y="0"/>
+          <a:chExt cx="0" cy="0"/>
+        </a:xfrm>
+      </p:grpSpPr>
+      <p:sp>
+        <p:nvSpPr>
+          <p:cNvPr id="500" name="PlaceHolder 1"/>
+          <p:cNvSpPr>
+            <a:spLocks noGrp="1"/>
+          </p:cNvSpPr>
+          <p:nvPr>
+            <p:ph type="body"/>
+          </p:nvPr>
+        </p:nvSpPr>
+        <p:spPr>
+          <a:xfrm>
+            <a:off x="685800" y="4400640"/>
+            <a:ext cx="5486040" cy="3600000"/>
+          </a:xfrm>
+          <a:prstGeom prst="rect">
+            <a:avLst/>
+          </a:prstGeom>
+        </p:spPr>
+        <p:txBody>
+          <a:bodyPr/>
+          <a:p>
+            <a:endParaRPr/>
+          </a:p>
+        </p:txBody>
+      </p:sp>
+      <p:sp>
+        <p:nvSpPr>
+          <p:cNvPr id="501" name="TextShape 2"/>
+          <p:cNvSpPr txBox="1"/>
+          <p:nvPr/>
+        </p:nvSpPr>
+        <p:spPr>
+          <a:xfrm>
+            <a:off x="3884760" y="8685360"/>
+            <a:ext cx="2971440" cy="458280"/>
+          </a:xfrm>
+          <a:prstGeom prst="rect">
+            <a:avLst/>
+          </a:prstGeom>
+          <a:noFill/>
+          <a:ln>
+            <a:noFill/>
+          </a:ln>
+        </p:spPr>
+        <p:txBody>
+          <a:bodyPr anchor="b"/>
+          <a:p>
+            <a:endParaRPr/>
+          </a:p>
+        </p:txBody>
+      </p:sp>
+    </p:spTree>
+  </p:cSld>
+</p:notes>
+</file>
+
+<file path=ppt/notesSlides/notesSlide19.xml><?xml version="1.0" encoding="utf-8"?>
+<p:notes xmlns:a="http://schemas.openxmlformats.org/drawingml/2006/main" xmlns:p="http://schemas.openxmlformats.org/presentationml/2006/main" xmlns:r="http://schemas.openxmlformats.org/officeDocument/2006/relationships">
+  <p:cSld>
+    <p:spTree>
+      <p:nvGrpSpPr>
+        <p:cNvPr id="1" name=""/>
+        <p:cNvGrpSpPr/>
+        <p:nvPr/>
+      </p:nvGrpSpPr>
+      <p:grpSpPr>
+        <a:xfrm>
+          <a:off x="0" y="0"/>
+          <a:ext cx="0" cy="0"/>
+          <a:chOff x="0" y="0"/>
+          <a:chExt cx="0" cy="0"/>
+        </a:xfrm>
+      </p:grpSpPr>
+      <p:sp>
+        <p:nvSpPr>
+          <p:cNvPr id="502" name="PlaceHolder 1"/>
+          <p:cNvSpPr>
+            <a:spLocks noGrp="1"/>
+          </p:cNvSpPr>
+          <p:nvPr>
+            <p:ph type="body"/>
+          </p:nvPr>
+        </p:nvSpPr>
+        <p:spPr>
+          <a:xfrm>
+            <a:off x="685800" y="4400640"/>
+            <a:ext cx="5486040" cy="3600000"/>
+          </a:xfrm>
+          <a:prstGeom prst="rect">
+            <a:avLst/>
+          </a:prstGeom>
+        </p:spPr>
+        <p:txBody>
+          <a:bodyPr/>
+          <a:p>
+            <a:endParaRPr/>
+          </a:p>
+        </p:txBody>
+      </p:sp>
+      <p:sp>
+        <p:nvSpPr>
+          <p:cNvPr id="503" name="TextShape 2"/>
           <p:cNvSpPr txBox="1"/>
           <p:nvPr/>
         </p:nvSpPr>
@@ -829,7 +980,7 @@
       </p:grpSpPr>
       <p:sp>
         <p:nvSpPr>
-          <p:cNvPr id="407" name="PlaceHolder 1"/>
+          <p:cNvPr id="468" name="PlaceHolder 1"/>
           <p:cNvSpPr>
             <a:spLocks noGrp="1"/>
           </p:cNvSpPr>
@@ -855,7 +1006,81 @@
       </p:sp>
       <p:sp>
         <p:nvSpPr>
-          <p:cNvPr id="408" name="TextShape 2"/>
+          <p:cNvPr id="469" name="TextShape 2"/>
+          <p:cNvSpPr txBox="1"/>
+          <p:nvPr/>
+        </p:nvSpPr>
+        <p:spPr>
+          <a:xfrm>
+            <a:off x="3884760" y="8685360"/>
+            <a:ext cx="2971440" cy="458280"/>
+          </a:xfrm>
+          <a:prstGeom prst="rect">
+            <a:avLst/>
+          </a:prstGeom>
+          <a:noFill/>
+          <a:ln>
+            <a:noFill/>
+          </a:ln>
+        </p:spPr>
+        <p:txBody>
+          <a:bodyPr anchor="b"/>
+          <a:p>
+            <a:endParaRPr/>
+          </a:p>
+        </p:txBody>
+      </p:sp>
+    </p:spTree>
+  </p:cSld>
+</p:notes>
+</file>
+
+<file path=ppt/notesSlides/notesSlide20.xml><?xml version="1.0" encoding="utf-8"?>
+<p:notes xmlns:a="http://schemas.openxmlformats.org/drawingml/2006/main" xmlns:p="http://schemas.openxmlformats.org/presentationml/2006/main" xmlns:r="http://schemas.openxmlformats.org/officeDocument/2006/relationships">
+  <p:cSld>
+    <p:spTree>
+      <p:nvGrpSpPr>
+        <p:cNvPr id="1" name=""/>
+        <p:cNvGrpSpPr/>
+        <p:nvPr/>
+      </p:nvGrpSpPr>
+      <p:grpSpPr>
+        <a:xfrm>
+          <a:off x="0" y="0"/>
+          <a:ext cx="0" cy="0"/>
+          <a:chOff x="0" y="0"/>
+          <a:chExt cx="0" cy="0"/>
+        </a:xfrm>
+      </p:grpSpPr>
+      <p:sp>
+        <p:nvSpPr>
+          <p:cNvPr id="504" name="PlaceHolder 1"/>
+          <p:cNvSpPr>
+            <a:spLocks noGrp="1"/>
+          </p:cNvSpPr>
+          <p:nvPr>
+            <p:ph type="body"/>
+          </p:nvPr>
+        </p:nvSpPr>
+        <p:spPr>
+          <a:xfrm>
+            <a:off x="685800" y="4400640"/>
+            <a:ext cx="5486040" cy="3600000"/>
+          </a:xfrm>
+          <a:prstGeom prst="rect">
+            <a:avLst/>
+          </a:prstGeom>
+        </p:spPr>
+        <p:txBody>
+          <a:bodyPr/>
+          <a:p>
+            <a:endParaRPr/>
+          </a:p>
+        </p:txBody>
+      </p:sp>
+      <p:sp>
+        <p:nvSpPr>
+          <p:cNvPr id="505" name="TextShape 2"/>
           <p:cNvSpPr txBox="1"/>
           <p:nvPr/>
         </p:nvSpPr>
@@ -903,7 +1128,7 @@
       </p:grpSpPr>
       <p:sp>
         <p:nvSpPr>
-          <p:cNvPr id="409" name="PlaceHolder 1"/>
+          <p:cNvPr id="470" name="PlaceHolder 1"/>
           <p:cNvSpPr>
             <a:spLocks noGrp="1"/>
           </p:cNvSpPr>
@@ -929,7 +1154,7 @@
       </p:sp>
       <p:sp>
         <p:nvSpPr>
-          <p:cNvPr id="410" name="TextShape 2"/>
+          <p:cNvPr id="471" name="TextShape 2"/>
           <p:cNvSpPr txBox="1"/>
           <p:nvPr/>
         </p:nvSpPr>
@@ -977,7 +1202,7 @@
       </p:grpSpPr>
       <p:sp>
         <p:nvSpPr>
-          <p:cNvPr id="411" name="PlaceHolder 1"/>
+          <p:cNvPr id="472" name="PlaceHolder 1"/>
           <p:cNvSpPr>
             <a:spLocks noGrp="1"/>
           </p:cNvSpPr>
@@ -1003,7 +1228,7 @@
       </p:sp>
       <p:sp>
         <p:nvSpPr>
-          <p:cNvPr id="412" name="TextShape 2"/>
+          <p:cNvPr id="473" name="TextShape 2"/>
           <p:cNvSpPr txBox="1"/>
           <p:nvPr/>
         </p:nvSpPr>
@@ -1051,7 +1276,7 @@
       </p:grpSpPr>
       <p:sp>
         <p:nvSpPr>
-          <p:cNvPr id="413" name="PlaceHolder 1"/>
+          <p:cNvPr id="474" name="PlaceHolder 1"/>
           <p:cNvSpPr>
             <a:spLocks noGrp="1"/>
           </p:cNvSpPr>
@@ -1077,7 +1302,7 @@
       </p:sp>
       <p:sp>
         <p:nvSpPr>
-          <p:cNvPr id="414" name="TextShape 2"/>
+          <p:cNvPr id="475" name="TextShape 2"/>
           <p:cNvSpPr txBox="1"/>
           <p:nvPr/>
         </p:nvSpPr>
@@ -1125,7 +1350,7 @@
       </p:grpSpPr>
       <p:sp>
         <p:nvSpPr>
-          <p:cNvPr id="415" name="PlaceHolder 1"/>
+          <p:cNvPr id="476" name="PlaceHolder 1"/>
           <p:cNvSpPr>
             <a:spLocks noGrp="1"/>
           </p:cNvSpPr>
@@ -1157,7 +1382,7 @@
       </p:sp>
       <p:sp>
         <p:nvSpPr>
-          <p:cNvPr id="416" name="TextShape 2"/>
+          <p:cNvPr id="477" name="TextShape 2"/>
           <p:cNvSpPr txBox="1"/>
           <p:nvPr/>
         </p:nvSpPr>
@@ -1205,7 +1430,7 @@
       </p:grpSpPr>
       <p:sp>
         <p:nvSpPr>
-          <p:cNvPr id="417" name="PlaceHolder 1"/>
+          <p:cNvPr id="478" name="PlaceHolder 1"/>
           <p:cNvSpPr>
             <a:spLocks noGrp="1"/>
           </p:cNvSpPr>
@@ -1237,7 +1462,7 @@
       </p:sp>
       <p:sp>
         <p:nvSpPr>
-          <p:cNvPr id="418" name="TextShape 2"/>
+          <p:cNvPr id="479" name="TextShape 2"/>
           <p:cNvSpPr txBox="1"/>
           <p:nvPr/>
         </p:nvSpPr>
@@ -1285,7 +1510,7 @@
       </p:grpSpPr>
       <p:sp>
         <p:nvSpPr>
-          <p:cNvPr id="419" name="PlaceHolder 1"/>
+          <p:cNvPr id="480" name="PlaceHolder 1"/>
           <p:cNvSpPr>
             <a:spLocks noGrp="1"/>
           </p:cNvSpPr>
@@ -1317,7 +1542,7 @@
       </p:sp>
       <p:sp>
         <p:nvSpPr>
-          <p:cNvPr id="420" name="TextShape 2"/>
+          <p:cNvPr id="481" name="TextShape 2"/>
           <p:cNvSpPr txBox="1"/>
           <p:nvPr/>
         </p:nvSpPr>
@@ -1365,7 +1590,7 @@
       </p:grpSpPr>
       <p:sp>
         <p:nvSpPr>
-          <p:cNvPr id="421" name="PlaceHolder 1"/>
+          <p:cNvPr id="482" name="PlaceHolder 1"/>
           <p:cNvSpPr>
             <a:spLocks noGrp="1"/>
           </p:cNvSpPr>
@@ -1391,7 +1616,7 @@
       </p:sp>
       <p:sp>
         <p:nvSpPr>
-          <p:cNvPr id="422" name="TextShape 2"/>
+          <p:cNvPr id="483" name="TextShape 2"/>
           <p:cNvSpPr txBox="1"/>
           <p:nvPr/>
         </p:nvSpPr>
@@ -12328,7 +12553,7 @@
                 </a:solidFill>
                 <a:latin typeface="Calibri"/>
               </a:rPr>
-              <a:t>Case Study: Portuguese Activity Sectors</a:t>
+              <a:t>Learning from realworld</a:t>
             </a:r>
             <a:endParaRPr/>
           </a:p>
@@ -12342,8 +12567,8 @@
         </p:nvSpPr>
         <p:spPr>
           <a:xfrm>
-            <a:off x="8727120" y="6400800"/>
-            <a:ext cx="2844360" cy="456840"/>
+            <a:off x="609480" y="1295280"/>
+            <a:ext cx="10972440" cy="5105160"/>
           </a:xfrm>
           <a:prstGeom prst="rect">
             <a:avLst/>
@@ -12354,6 +12579,300 @@
           </a:ln>
         </p:spPr>
         <p:txBody>
+          <a:bodyPr/>
+          <a:p>
+            <a:pPr>
+              <a:lnSpc>
+                <a:spcPct val="100000"/>
+              </a:lnSpc>
+              <a:buSzPct val="65000"/>
+              <a:buFont typeface="Wingdings" charset="2"/>
+              <a:buChar char=""/>
+            </a:pPr>
+            <a:r>
+              <a:rPr lang="de-DE" sz="2000" strike="noStrike">
+                <a:solidFill>
+                  <a:srgbClr val="000000"/>
+                </a:solidFill>
+                <a:latin typeface="Calibri"/>
+              </a:rPr>
+              <a:t>the author has conducted a learning of threshold with two different data set</a:t>
+            </a:r>
+            <a:r>
+              <a:rPr lang="de-DE" sz="2000" strike="noStrike">
+                <a:solidFill>
+                  <a:srgbClr val="000000"/>
+                </a:solidFill>
+                <a:latin typeface="Calibri"/>
+                <a:ea typeface="宋体"/>
+              </a:rPr>
+              <a:t>：</a:t>
+            </a:r>
+            <a:endParaRPr/>
+          </a:p>
+          <a:p>
+            <a:pPr lvl="1">
+              <a:lnSpc>
+                <a:spcPct val="100000"/>
+              </a:lnSpc>
+              <a:buSzPct val="60000"/>
+              <a:buFont typeface="Wingdings" charset="2"/>
+              <a:buChar char=""/>
+            </a:pPr>
+            <a:r>
+              <a:rPr lang="de-DE" strike="noStrike">
+                <a:solidFill>
+                  <a:srgbClr val="000000"/>
+                </a:solidFill>
+                <a:latin typeface="Calibri"/>
+                <a:ea typeface="宋体"/>
+              </a:rPr>
+              <a:t>Banco de Portugal's Central Balance-Sheet Database and</a:t>
+            </a:r>
+            <a:endParaRPr/>
+          </a:p>
+          <a:p>
+            <a:pPr lvl="1">
+              <a:lnSpc>
+                <a:spcPct val="100000"/>
+              </a:lnSpc>
+              <a:buSzPct val="60000"/>
+              <a:buFont typeface="Wingdings" charset="2"/>
+              <a:buChar char=""/>
+            </a:pPr>
+            <a:r>
+              <a:rPr lang="de-DE" strike="noStrike">
+                <a:solidFill>
+                  <a:srgbClr val="000000"/>
+                </a:solidFill>
+                <a:latin typeface="Calibri"/>
+                <a:ea typeface="宋体"/>
+              </a:rPr>
+              <a:t>The Data Page of New York University - Leonard N. Stern School of Business</a:t>
+            </a:r>
+            <a:endParaRPr/>
+          </a:p>
+          <a:p>
+            <a:pPr>
+              <a:lnSpc>
+                <a:spcPct val="100000"/>
+              </a:lnSpc>
+              <a:buSzPct val="65000"/>
+              <a:buFont typeface="Wingdings" charset="2"/>
+              <a:buChar char=""/>
+            </a:pPr>
+            <a:r>
+              <a:rPr lang="de-DE" sz="2000" strike="noStrike">
+                <a:solidFill>
+                  <a:srgbClr val="000000"/>
+                </a:solidFill>
+                <a:latin typeface="Calibri"/>
+                <a:ea typeface="宋体"/>
+              </a:rPr>
+              <a:t>with starting  condition that the two arguments vary in correspondly interval:</a:t>
+            </a:r>
+            <a:endParaRPr/>
+          </a:p>
+          <a:p>
+            <a:pPr lvl="1">
+              <a:lnSpc>
+                <a:spcPct val="100000"/>
+              </a:lnSpc>
+              <a:buSzPct val="60000"/>
+              <a:buFont typeface="Wingdings" charset="2"/>
+              <a:buChar char=""/>
+            </a:pPr>
+            <a:r>
+              <a:rPr lang="de-DE" sz="1620" strike="noStrike">
+                <a:solidFill>
+                  <a:srgbClr val="000000"/>
+                </a:solidFill>
+                <a:latin typeface="Calibri"/>
+                <a:ea typeface="宋体"/>
+              </a:rPr>
+              <a:t>τin [0.5, 1]</a:t>
+            </a:r>
+            <a:endParaRPr/>
+          </a:p>
+          <a:p>
+            <a:pPr lvl="1">
+              <a:lnSpc>
+                <a:spcPct val="100000"/>
+              </a:lnSpc>
+              <a:buSzPct val="60000"/>
+              <a:buFont typeface="Wingdings" charset="2"/>
+              <a:buChar char=""/>
+            </a:pPr>
+            <a:r>
+              <a:rPr lang="de-DE" sz="1620" strike="noStrike">
+                <a:solidFill>
+                  <a:srgbClr val="000000"/>
+                </a:solidFill>
+                <a:latin typeface="Calibri"/>
+                <a:ea typeface="宋体"/>
+              </a:rPr>
+              <a:t>λin [0, 0.4]</a:t>
+            </a:r>
+            <a:endParaRPr/>
+          </a:p>
+          <a:p>
+            <a:pPr>
+              <a:lnSpc>
+                <a:spcPct val="100000"/>
+              </a:lnSpc>
+              <a:buSzPct val="65000"/>
+              <a:buFont typeface="Wingdings" charset="2"/>
+              <a:buChar char=""/>
+            </a:pPr>
+            <a:r>
+              <a:rPr lang="de-DE" sz="2000" strike="noStrike">
+                <a:solidFill>
+                  <a:srgbClr val="000000"/>
+                </a:solidFill>
+                <a:latin typeface="Calibri"/>
+                <a:ea typeface="宋体"/>
+              </a:rPr>
+              <a:t>final assignment:</a:t>
+            </a:r>
+            <a:endParaRPr/>
+          </a:p>
+          <a:p>
+            <a:pPr lvl="1">
+              <a:lnSpc>
+                <a:spcPct val="100000"/>
+              </a:lnSpc>
+              <a:buSzPct val="60000"/>
+              <a:buFont typeface="Wingdings" charset="2"/>
+              <a:buChar char=""/>
+            </a:pPr>
+            <a:r>
+              <a:rPr lang="de-DE" sz="1620" strike="noStrike">
+                <a:solidFill>
+                  <a:srgbClr val="000000"/>
+                </a:solidFill>
+                <a:latin typeface="Calibri"/>
+                <a:ea typeface="宋体"/>
+              </a:rPr>
+              <a:t>τ=0.6</a:t>
+            </a:r>
+            <a:endParaRPr/>
+          </a:p>
+          <a:p>
+            <a:pPr lvl="1">
+              <a:lnSpc>
+                <a:spcPct val="100000"/>
+              </a:lnSpc>
+              <a:buSzPct val="60000"/>
+              <a:buFont typeface="Wingdings" charset="2"/>
+              <a:buChar char=""/>
+            </a:pPr>
+            <a:r>
+              <a:rPr lang="de-DE" sz="1620" strike="noStrike">
+                <a:solidFill>
+                  <a:srgbClr val="000000"/>
+                </a:solidFill>
+                <a:latin typeface="Calibri"/>
+                <a:ea typeface="宋体"/>
+              </a:rPr>
+              <a:t>λ=0.2</a:t>
+            </a:r>
+            <a:endParaRPr/>
+          </a:p>
+          <a:p>
+            <a:pPr>
+              <a:lnSpc>
+                <a:spcPct val="100000"/>
+              </a:lnSpc>
+              <a:buSzPct val="65000"/>
+              <a:buFont typeface="Wingdings" charset="2"/>
+              <a:buChar char=""/>
+            </a:pPr>
+            <a:r>
+              <a:rPr lang="de-DE" sz="2000" strike="noStrike">
+                <a:solidFill>
+                  <a:srgbClr val="000000"/>
+                </a:solidFill>
+                <a:latin typeface="Calibri"/>
+                <a:ea typeface="宋体"/>
+              </a:rPr>
+              <a:t>also the affectivness of two thresholds</a:t>
+            </a:r>
+            <a:r>
+              <a:rPr lang="de-DE" sz="2000" strike="noStrike">
+                <a:solidFill>
+                  <a:srgbClr val="000000"/>
+                </a:solidFill>
+                <a:latin typeface="Calibri"/>
+                <a:ea typeface="宋体"/>
+              </a:rPr>
+              <a:t>：</a:t>
+            </a:r>
+            <a:endParaRPr/>
+          </a:p>
+          <a:p>
+            <a:pPr lvl="1">
+              <a:lnSpc>
+                <a:spcPct val="100000"/>
+              </a:lnSpc>
+              <a:buSzPct val="60000"/>
+              <a:buFont typeface="Wingdings" charset="2"/>
+              <a:buChar char=""/>
+            </a:pPr>
+            <a:r>
+              <a:rPr lang="de-DE" strike="noStrike">
+                <a:solidFill>
+                  <a:srgbClr val="000000"/>
+                </a:solidFill>
+                <a:latin typeface="Calibri"/>
+                <a:ea typeface="宋体"/>
+              </a:rPr>
+              <a:t>split threshold values is not critical</a:t>
+            </a:r>
+            <a:endParaRPr/>
+          </a:p>
+          <a:p>
+            <a:pPr lvl="1">
+              <a:lnSpc>
+                <a:spcPct val="100000"/>
+              </a:lnSpc>
+              <a:buSzPct val="60000"/>
+              <a:buFont typeface="Wingdings" charset="2"/>
+              <a:buChar char=""/>
+            </a:pPr>
+            <a:r>
+              <a:rPr lang="de-DE" strike="noStrike">
+                <a:solidFill>
+                  <a:srgbClr val="000000"/>
+                </a:solidFill>
+                <a:latin typeface="Calibri"/>
+                <a:ea typeface="宋体"/>
+              </a:rPr>
+              <a:t>number of transitions are more volatile and sensitive to small variations of τ</a:t>
+            </a:r>
+            <a:endParaRPr/>
+          </a:p>
+        </p:txBody>
+      </p:sp>
+      <p:sp>
+        <p:nvSpPr>
+          <p:cNvPr id="391" name="TextShape 3"/>
+          <p:cNvSpPr txBox="1"/>
+          <p:nvPr/>
+        </p:nvSpPr>
+        <p:spPr>
+          <a:xfrm>
+            <a:off x="8727120" y="6400800"/>
+            <a:ext cx="2844360" cy="456840"/>
+          </a:xfrm>
+          <a:prstGeom prst="rect">
+            <a:avLst/>
+          </a:prstGeom>
+          <a:noFill/>
+          <a:ln w="9360">
+            <a:noFill/>
+          </a:ln>
+        </p:spPr>
+        <p:txBody>
           <a:bodyPr anchor="b"/>
           <a:p>
             <a:endParaRPr/>
@@ -12362,7 +12881,7 @@
       </p:sp>
       <p:sp>
         <p:nvSpPr>
-          <p:cNvPr id="391" name="TextShape 3"/>
+          <p:cNvPr id="392" name="TextShape 4"/>
           <p:cNvSpPr txBox="1"/>
           <p:nvPr/>
         </p:nvSpPr>
@@ -12398,65 +12917,6 @@
                 <a:latin typeface="Calibri"/>
               </a:rPr>
               <a:t>Present, Papers titlte</a:t>
-            </a:r>
-            <a:endParaRPr/>
-          </a:p>
-        </p:txBody>
-      </p:sp>
-      <p:sp>
-        <p:nvSpPr>
-          <p:cNvPr id="392" name="TextShape 4"/>
-          <p:cNvSpPr txBox="1"/>
-          <p:nvPr/>
-        </p:nvSpPr>
-        <p:spPr>
-          <a:xfrm>
-            <a:off x="936000" y="1512000"/>
-            <a:ext cx="5878800" cy="1114200"/>
-          </a:xfrm>
-          <a:prstGeom prst="rect">
-            <a:avLst/>
-          </a:prstGeom>
-          <a:noFill/>
-          <a:ln>
-            <a:noFill/>
-          </a:ln>
-        </p:spPr>
-        <p:txBody>
-          <a:bodyPr lIns="90000" rIns="90000" tIns="45000" bIns="45000"/>
-          <a:p>
-            <a:r>
-              <a:rPr lang="en-US">
-                <a:latin typeface="Arial"/>
-              </a:rPr>
-              <a:t>Over 3 years (2005, 2006, 2007)</a:t>
-            </a:r>
-            <a:endParaRPr/>
-          </a:p>
-          <a:p>
-            <a:r>
-              <a:rPr lang="en-US">
-                <a:latin typeface="Arial"/>
-              </a:rPr>
-              <a:t>12 Observations</a:t>
-            </a:r>
-            <a:endParaRPr/>
-          </a:p>
-          <a:p>
-            <a:r>
-              <a:rPr lang="en-US">
-                <a:latin typeface="Arial"/>
-              </a:rPr>
-              <a:t>9 continuous attributes</a:t>
-            </a:r>
-            <a:endParaRPr/>
-          </a:p>
-          <a:p>
-            <a:r>
-              <a:rPr lang="en-US">
-                <a:latin typeface="Arial"/>
-              </a:rPr>
-              <a:t>Supervised learning → in order to specify two thresholds</a:t>
             </a:r>
             <a:endParaRPr/>
           </a:p>
@@ -12545,7 +13005,7 @@
                 </a:solidFill>
                 <a:latin typeface="Calibri"/>
               </a:rPr>
-              <a:t>Learning from realworld</a:t>
+              <a:t>Case Study 1: Portuguese Activity Sectors</a:t>
             </a:r>
             <a:endParaRPr/>
           </a:p>
@@ -12559,8 +13019,8 @@
         </p:nvSpPr>
         <p:spPr>
           <a:xfrm>
-            <a:off x="609480" y="1295280"/>
-            <a:ext cx="10972440" cy="5105160"/>
+            <a:off x="8727120" y="6400800"/>
+            <a:ext cx="2844360" cy="456840"/>
           </a:xfrm>
           <a:prstGeom prst="rect">
             <a:avLst/>
@@ -12571,276 +13031,8 @@
           </a:ln>
         </p:spPr>
         <p:txBody>
-          <a:bodyPr/>
-          <a:p>
-            <a:pPr>
-              <a:lnSpc>
-                <a:spcPct val="100000"/>
-              </a:lnSpc>
-              <a:buSzPct val="65000"/>
-              <a:buFont typeface="Wingdings" charset="2"/>
-              <a:buChar char=""/>
-            </a:pPr>
-            <a:r>
-              <a:rPr lang="de-DE" sz="2000" strike="noStrike">
-                <a:solidFill>
-                  <a:srgbClr val="000000"/>
-                </a:solidFill>
-                <a:latin typeface="Calibri"/>
-              </a:rPr>
-              <a:t>the author has conducted a learning of threshold with two different data set</a:t>
-            </a:r>
-            <a:r>
-              <a:rPr lang="de-DE" sz="2000" strike="noStrike">
-                <a:solidFill>
-                  <a:srgbClr val="000000"/>
-                </a:solidFill>
-                <a:latin typeface="Calibri"/>
-                <a:ea typeface="宋体"/>
-              </a:rPr>
-              <a:t>：</a:t>
-            </a:r>
-            <a:endParaRPr/>
-          </a:p>
-          <a:p>
-            <a:pPr lvl="1">
-              <a:lnSpc>
-                <a:spcPct val="100000"/>
-              </a:lnSpc>
-              <a:buSzPct val="60000"/>
-              <a:buFont typeface="Wingdings" charset="2"/>
-              <a:buChar char=""/>
-            </a:pPr>
-            <a:r>
-              <a:rPr lang="de-DE" strike="noStrike">
-                <a:solidFill>
-                  <a:srgbClr val="000000"/>
-                </a:solidFill>
-                <a:latin typeface="Calibri"/>
-                <a:ea typeface="宋体"/>
-              </a:rPr>
-              <a:t>Banco de Portugal's Central Balance-Sheet Database and</a:t>
-            </a:r>
-            <a:endParaRPr/>
-          </a:p>
-          <a:p>
-            <a:pPr lvl="1">
-              <a:lnSpc>
-                <a:spcPct val="100000"/>
-              </a:lnSpc>
-              <a:buSzPct val="60000"/>
-              <a:buFont typeface="Wingdings" charset="2"/>
-              <a:buChar char=""/>
-            </a:pPr>
-            <a:r>
-              <a:rPr lang="de-DE" strike="noStrike">
-                <a:solidFill>
-                  <a:srgbClr val="000000"/>
-                </a:solidFill>
-                <a:latin typeface="Calibri"/>
-                <a:ea typeface="宋体"/>
-              </a:rPr>
-              <a:t>The Data Page of New York University - Leonard N. Stern School of Business</a:t>
-            </a:r>
-            <a:endParaRPr/>
-          </a:p>
-          <a:p>
-            <a:pPr>
-              <a:lnSpc>
-                <a:spcPct val="100000"/>
-              </a:lnSpc>
-              <a:buSzPct val="65000"/>
-              <a:buFont typeface="Wingdings" charset="2"/>
-              <a:buChar char=""/>
-            </a:pPr>
-            <a:r>
-              <a:rPr lang="de-DE" sz="2000" strike="noStrike">
-                <a:solidFill>
-                  <a:srgbClr val="000000"/>
-                </a:solidFill>
-                <a:latin typeface="Calibri"/>
-                <a:ea typeface="宋体"/>
-              </a:rPr>
-              <a:t>with starting  condition that the two arguments vary in correspondly interval:</a:t>
-            </a:r>
-            <a:endParaRPr/>
-          </a:p>
-          <a:p>
-            <a:pPr lvl="1">
-              <a:lnSpc>
-                <a:spcPct val="100000"/>
-              </a:lnSpc>
-              <a:buSzPct val="60000"/>
-              <a:buFont typeface="Wingdings" charset="2"/>
-              <a:buChar char=""/>
-            </a:pPr>
-            <a:r>
-              <a:rPr lang="de-DE" sz="1620" strike="noStrike">
-                <a:solidFill>
-                  <a:srgbClr val="000000"/>
-                </a:solidFill>
-                <a:latin typeface="Calibri"/>
-                <a:ea typeface="宋体"/>
-              </a:rPr>
-              <a:t>τin [0.5, 1]</a:t>
-            </a:r>
-            <a:endParaRPr/>
-          </a:p>
-          <a:p>
-            <a:pPr lvl="1">
-              <a:lnSpc>
-                <a:spcPct val="100000"/>
-              </a:lnSpc>
-              <a:buSzPct val="60000"/>
-              <a:buFont typeface="Wingdings" charset="2"/>
-              <a:buChar char=""/>
-            </a:pPr>
-            <a:r>
-              <a:rPr lang="de-DE" sz="1620" strike="noStrike">
-                <a:solidFill>
-                  <a:srgbClr val="000000"/>
-                </a:solidFill>
-                <a:latin typeface="Calibri"/>
-                <a:ea typeface="宋体"/>
-              </a:rPr>
-              <a:t>λin [0, 0.4]</a:t>
-            </a:r>
-            <a:endParaRPr/>
-          </a:p>
-          <a:p>
-            <a:pPr>
-              <a:lnSpc>
-                <a:spcPct val="100000"/>
-              </a:lnSpc>
-              <a:buSzPct val="65000"/>
-              <a:buFont typeface="Wingdings" charset="2"/>
-              <a:buChar char=""/>
-            </a:pPr>
-            <a:r>
-              <a:rPr lang="de-DE" sz="2000" strike="noStrike">
-                <a:solidFill>
-                  <a:srgbClr val="000000"/>
-                </a:solidFill>
-                <a:latin typeface="Calibri"/>
-                <a:ea typeface="宋体"/>
-              </a:rPr>
-              <a:t>final assignment:</a:t>
-            </a:r>
-            <a:endParaRPr/>
-          </a:p>
-          <a:p>
-            <a:pPr lvl="1">
-              <a:lnSpc>
-                <a:spcPct val="100000"/>
-              </a:lnSpc>
-              <a:buSzPct val="60000"/>
-              <a:buFont typeface="Wingdings" charset="2"/>
-              <a:buChar char=""/>
-            </a:pPr>
-            <a:r>
-              <a:rPr lang="de-DE" sz="1620" strike="noStrike">
-                <a:solidFill>
-                  <a:srgbClr val="000000"/>
-                </a:solidFill>
-                <a:latin typeface="Calibri"/>
-                <a:ea typeface="宋体"/>
-              </a:rPr>
-              <a:t>τ=0.6</a:t>
-            </a:r>
-            <a:endParaRPr/>
-          </a:p>
-          <a:p>
-            <a:pPr lvl="1">
-              <a:lnSpc>
-                <a:spcPct val="100000"/>
-              </a:lnSpc>
-              <a:buSzPct val="60000"/>
-              <a:buFont typeface="Wingdings" charset="2"/>
-              <a:buChar char=""/>
-            </a:pPr>
-            <a:r>
-              <a:rPr lang="de-DE" sz="1620" strike="noStrike">
-                <a:solidFill>
-                  <a:srgbClr val="000000"/>
-                </a:solidFill>
-                <a:latin typeface="Calibri"/>
-                <a:ea typeface="宋体"/>
-              </a:rPr>
-              <a:t>λ=0.2</a:t>
-            </a:r>
-            <a:endParaRPr/>
-          </a:p>
-          <a:p>
-            <a:pPr>
-              <a:lnSpc>
-                <a:spcPct val="100000"/>
-              </a:lnSpc>
-              <a:buSzPct val="65000"/>
-              <a:buFont typeface="Wingdings" charset="2"/>
-              <a:buChar char=""/>
-            </a:pPr>
-            <a:r>
-              <a:rPr lang="de-DE" sz="2000" strike="noStrike">
-                <a:solidFill>
-                  <a:srgbClr val="000000"/>
-                </a:solidFill>
-                <a:latin typeface="Calibri"/>
-                <a:ea typeface="宋体"/>
-              </a:rPr>
-              <a:t>also the affectivness of two thresholds</a:t>
-            </a:r>
-            <a:r>
-              <a:rPr lang="de-DE" sz="2000" strike="noStrike">
-                <a:solidFill>
-                  <a:srgbClr val="000000"/>
-                </a:solidFill>
-                <a:latin typeface="Calibri"/>
-                <a:ea typeface="宋体"/>
-              </a:rPr>
-              <a:t>：</a:t>
-            </a:r>
-            <a:endParaRPr/>
-          </a:p>
-          <a:p>
-            <a:pPr lvl="1">
-              <a:lnSpc>
-                <a:spcPct val="100000"/>
-              </a:lnSpc>
-              <a:buSzPct val="60000"/>
-              <a:buFont typeface="Wingdings" charset="2"/>
-              <a:buChar char=""/>
-            </a:pPr>
-            <a:r>
-              <a:rPr lang="de-DE" strike="noStrike">
-                <a:solidFill>
-                  <a:srgbClr val="000000"/>
-                </a:solidFill>
-                <a:latin typeface="Calibri"/>
-                <a:ea typeface="宋体"/>
-              </a:rPr>
-              <a:t>split threshold values is not critical</a:t>
-            </a:r>
-            <a:endParaRPr/>
-          </a:p>
-          <a:p>
-            <a:pPr lvl="1">
-              <a:lnSpc>
-                <a:spcPct val="100000"/>
-              </a:lnSpc>
-              <a:buSzPct val="60000"/>
-              <a:buFont typeface="Wingdings" charset="2"/>
-              <a:buChar char=""/>
-            </a:pPr>
-            <a:r>
-              <a:rPr lang="de-DE" strike="noStrike">
-                <a:solidFill>
-                  <a:srgbClr val="000000"/>
-                </a:solidFill>
-                <a:latin typeface="Calibri"/>
-                <a:ea typeface="宋体"/>
-              </a:rPr>
-              <a:t>number of transitions are more volatile and sensitive to small variations of τ</a:t>
-            </a:r>
+          <a:bodyPr anchor="b"/>
+          <a:p>
             <a:endParaRPr/>
           </a:p>
         </p:txBody>
@@ -12848,32 +13040,6 @@
       <p:sp>
         <p:nvSpPr>
           <p:cNvPr id="395" name="TextShape 3"/>
-          <p:cNvSpPr txBox="1"/>
-          <p:nvPr/>
-        </p:nvSpPr>
-        <p:spPr>
-          <a:xfrm>
-            <a:off x="8727120" y="6400800"/>
-            <a:ext cx="2844360" cy="456840"/>
-          </a:xfrm>
-          <a:prstGeom prst="rect">
-            <a:avLst/>
-          </a:prstGeom>
-          <a:noFill/>
-          <a:ln w="9360">
-            <a:noFill/>
-          </a:ln>
-        </p:spPr>
-        <p:txBody>
-          <a:bodyPr anchor="b"/>
-          <a:p>
-            <a:endParaRPr/>
-          </a:p>
-        </p:txBody>
-      </p:sp>
-      <p:sp>
-        <p:nvSpPr>
-          <p:cNvPr id="396" name="TextShape 4"/>
           <p:cNvSpPr txBox="1"/>
           <p:nvPr/>
         </p:nvSpPr>
@@ -12913,6 +13079,914 @@
             <a:endParaRPr/>
           </a:p>
         </p:txBody>
+      </p:sp>
+      <p:sp>
+        <p:nvSpPr>
+          <p:cNvPr id="396" name="Line 4"/>
+          <p:cNvSpPr/>
+          <p:nvPr/>
+        </p:nvSpPr>
+        <p:spPr>
+          <a:xfrm>
+            <a:off x="3348000" y="5328000"/>
+            <a:ext cx="5184000" cy="0"/>
+          </a:xfrm>
+          <a:prstGeom prst="line">
+            <a:avLst/>
+          </a:prstGeom>
+          <a:ln w="38160">
+            <a:solidFill>
+              <a:srgbClr val="666666"/>
+            </a:solidFill>
+            <a:round/>
+            <a:tailEnd len="med" type="triangle" w="med"/>
+          </a:ln>
+        </p:spPr>
+      </p:sp>
+      <p:sp>
+        <p:nvSpPr>
+          <p:cNvPr id="397" name="Line 5"/>
+          <p:cNvSpPr/>
+          <p:nvPr/>
+        </p:nvSpPr>
+        <p:spPr>
+          <a:xfrm flipV="1">
+            <a:off x="3348000" y="2088000"/>
+            <a:ext cx="0" cy="3240000"/>
+          </a:xfrm>
+          <a:prstGeom prst="line">
+            <a:avLst/>
+          </a:prstGeom>
+          <a:ln w="38160">
+            <a:solidFill>
+              <a:srgbClr val="666666"/>
+            </a:solidFill>
+            <a:round/>
+            <a:tailEnd len="med" type="triangle" w="med"/>
+          </a:ln>
+        </p:spPr>
+      </p:sp>
+      <p:sp>
+        <p:nvSpPr>
+          <p:cNvPr id="398" name="Line 6"/>
+          <p:cNvSpPr/>
+          <p:nvPr/>
+        </p:nvSpPr>
+        <p:spPr>
+          <a:xfrm flipV="1">
+            <a:off x="3348000" y="3600000"/>
+            <a:ext cx="4680000" cy="1728000"/>
+          </a:xfrm>
+          <a:prstGeom prst="line">
+            <a:avLst/>
+          </a:prstGeom>
+          <a:ln w="38160">
+            <a:solidFill>
+              <a:srgbClr val="666666"/>
+            </a:solidFill>
+            <a:round/>
+            <a:tailEnd len="med" type="triangle" w="med"/>
+          </a:ln>
+        </p:spPr>
+      </p:sp>
+      <p:sp>
+        <p:nvSpPr>
+          <p:cNvPr id="399" name="TextShape 7"/>
+          <p:cNvSpPr txBox="1"/>
+          <p:nvPr/>
+        </p:nvSpPr>
+        <p:spPr>
+          <a:xfrm>
+            <a:off x="3636000" y="5544000"/>
+            <a:ext cx="4921920" cy="402840"/>
+          </a:xfrm>
+          <a:prstGeom prst="rect">
+            <a:avLst/>
+          </a:prstGeom>
+          <a:noFill/>
+          <a:ln>
+            <a:noFill/>
+          </a:ln>
+        </p:spPr>
+        <p:txBody>
+          <a:bodyPr lIns="90000" rIns="90000" tIns="45000" bIns="45000"/>
+          <a:p>
+            <a:r>
+              <a:rPr lang="en-US" sz="2200">
+                <a:latin typeface="Arial"/>
+              </a:rPr>
+              <a:t>Time: over 3 years (2005, 2006, 2007)</a:t>
+            </a:r>
+            <a:endParaRPr/>
+          </a:p>
+        </p:txBody>
+      </p:sp>
+      <p:sp>
+        <p:nvSpPr>
+          <p:cNvPr id="400" name="TextShape 8"/>
+          <p:cNvSpPr txBox="1"/>
+          <p:nvPr/>
+        </p:nvSpPr>
+        <p:spPr>
+          <a:xfrm rot="20428200">
+            <a:off x="5037480" y="3705120"/>
+            <a:ext cx="5491800" cy="715320"/>
+          </a:xfrm>
+          <a:prstGeom prst="rect">
+            <a:avLst/>
+          </a:prstGeom>
+          <a:noFill/>
+          <a:ln>
+            <a:noFill/>
+          </a:ln>
+        </p:spPr>
+        <p:txBody>
+          <a:bodyPr lIns="90000" rIns="90000" tIns="45000" bIns="45000"/>
+          <a:p>
+            <a:r>
+              <a:rPr lang="en-US" sz="2200">
+                <a:latin typeface="Arial"/>
+              </a:rPr>
+              <a:t>Observations: 12 Principal Activity Sectors </a:t>
+            </a:r>
+            <a:endParaRPr/>
+          </a:p>
+          <a:p>
+            <a:r>
+              <a:rPr lang="en-US" sz="2200">
+                <a:latin typeface="Arial"/>
+              </a:rPr>
+              <a:t>(Education, Manufacturing, etc.)</a:t>
+            </a:r>
+            <a:endParaRPr/>
+          </a:p>
+        </p:txBody>
+      </p:sp>
+      <p:sp>
+        <p:nvSpPr>
+          <p:cNvPr id="401" name="TextShape 9"/>
+          <p:cNvSpPr txBox="1"/>
+          <p:nvPr/>
+        </p:nvSpPr>
+        <p:spPr>
+          <a:xfrm>
+            <a:off x="1332000" y="1613160"/>
+            <a:ext cx="7503480" cy="402840"/>
+          </a:xfrm>
+          <a:prstGeom prst="rect">
+            <a:avLst/>
+          </a:prstGeom>
+          <a:noFill/>
+          <a:ln>
+            <a:noFill/>
+          </a:ln>
+        </p:spPr>
+        <p:txBody>
+          <a:bodyPr lIns="90000" rIns="90000" tIns="45000" bIns="45000"/>
+          <a:p>
+            <a:r>
+              <a:rPr lang="en-US" sz="2200">
+                <a:latin typeface="Arial"/>
+              </a:rPr>
+              <a:t>Metric: Z-scores using standardized 9 continuous attributes</a:t>
+            </a:r>
+            <a:endParaRPr/>
+          </a:p>
+        </p:txBody>
+      </p:sp>
+      <p:sp>
+        <p:nvSpPr>
+          <p:cNvPr id="402" name="CustomShape 10"/>
+          <p:cNvSpPr/>
+          <p:nvPr/>
+        </p:nvSpPr>
+        <p:spPr>
+          <a:xfrm rot="20382000">
+            <a:off x="3719880" y="2376720"/>
+            <a:ext cx="2880000" cy="2520000"/>
+          </a:xfrm>
+          <a:prstGeom prst="parallelogram">
+            <a:avLst>
+              <a:gd name="adj" fmla="val 7081"/>
+            </a:avLst>
+          </a:prstGeom>
+          <a:solidFill>
+            <a:srgbClr val="729fcf">
+              <a:alpha val="50000"/>
+            </a:srgbClr>
+          </a:solidFill>
+          <a:ln>
+            <a:solidFill>
+              <a:srgbClr val="729fcf"/>
+            </a:solidFill>
+          </a:ln>
+        </p:spPr>
+        <p:style>
+          <a:lnRef idx="0"/>
+          <a:fillRef idx="0"/>
+          <a:effectRef idx="0"/>
+          <a:fontRef idx="minor"/>
+        </p:style>
+      </p:sp>
+      <p:sp>
+        <p:nvSpPr>
+          <p:cNvPr id="403" name="CustomShape 11"/>
+          <p:cNvSpPr/>
+          <p:nvPr/>
+        </p:nvSpPr>
+        <p:spPr>
+          <a:xfrm>
+            <a:off x="4787640" y="3024360"/>
+            <a:ext cx="216000" cy="216000"/>
+          </a:xfrm>
+          <a:prstGeom prst="ellipse">
+            <a:avLst/>
+          </a:prstGeom>
+          <a:solidFill>
+            <a:srgbClr val="ff420e"/>
+          </a:solidFill>
+          <a:ln>
+            <a:solidFill>
+              <a:srgbClr val="3465a4"/>
+            </a:solidFill>
+          </a:ln>
+        </p:spPr>
+        <p:style>
+          <a:lnRef idx="0"/>
+          <a:fillRef idx="0"/>
+          <a:effectRef idx="0"/>
+          <a:fontRef idx="minor"/>
+        </p:style>
+      </p:sp>
+      <p:sp>
+        <p:nvSpPr>
+          <p:cNvPr id="404" name="CustomShape 12"/>
+          <p:cNvSpPr/>
+          <p:nvPr/>
+        </p:nvSpPr>
+        <p:spPr>
+          <a:xfrm>
+            <a:off x="4428000" y="3348720"/>
+            <a:ext cx="216000" cy="216000"/>
+          </a:xfrm>
+          <a:prstGeom prst="ellipse">
+            <a:avLst/>
+          </a:prstGeom>
+          <a:solidFill>
+            <a:srgbClr val="ff420e"/>
+          </a:solidFill>
+          <a:ln>
+            <a:solidFill>
+              <a:srgbClr val="3465a4"/>
+            </a:solidFill>
+          </a:ln>
+        </p:spPr>
+        <p:style>
+          <a:lnRef idx="0"/>
+          <a:fillRef idx="0"/>
+          <a:effectRef idx="0"/>
+          <a:fontRef idx="minor"/>
+        </p:style>
+      </p:sp>
+      <p:sp>
+        <p:nvSpPr>
+          <p:cNvPr id="405" name="CustomShape 13"/>
+          <p:cNvSpPr/>
+          <p:nvPr/>
+        </p:nvSpPr>
+        <p:spPr>
+          <a:xfrm>
+            <a:off x="4536000" y="2808720"/>
+            <a:ext cx="216000" cy="216000"/>
+          </a:xfrm>
+          <a:prstGeom prst="ellipse">
+            <a:avLst/>
+          </a:prstGeom>
+          <a:solidFill>
+            <a:srgbClr val="ff420e"/>
+          </a:solidFill>
+          <a:ln>
+            <a:solidFill>
+              <a:srgbClr val="3465a4"/>
+            </a:solidFill>
+          </a:ln>
+        </p:spPr>
+        <p:style>
+          <a:lnRef idx="0"/>
+          <a:fillRef idx="0"/>
+          <a:effectRef idx="0"/>
+          <a:fontRef idx="minor"/>
+        </p:style>
+      </p:sp>
+      <p:sp>
+        <p:nvSpPr>
+          <p:cNvPr id="406" name="CustomShape 14"/>
+          <p:cNvSpPr/>
+          <p:nvPr/>
+        </p:nvSpPr>
+        <p:spPr>
+          <a:xfrm>
+            <a:off x="5580000" y="3851640"/>
+            <a:ext cx="216000" cy="216000"/>
+          </a:xfrm>
+          <a:prstGeom prst="ellipse">
+            <a:avLst/>
+          </a:prstGeom>
+          <a:solidFill>
+            <a:srgbClr val="99ff33"/>
+          </a:solidFill>
+          <a:ln>
+            <a:solidFill>
+              <a:srgbClr val="3465a4"/>
+            </a:solidFill>
+          </a:ln>
+        </p:spPr>
+        <p:style>
+          <a:lnRef idx="0"/>
+          <a:fillRef idx="0"/>
+          <a:effectRef idx="0"/>
+          <a:fontRef idx="minor"/>
+        </p:style>
+      </p:sp>
+      <p:sp>
+        <p:nvSpPr>
+          <p:cNvPr id="407" name="CustomShape 15"/>
+          <p:cNvSpPr/>
+          <p:nvPr/>
+        </p:nvSpPr>
+        <p:spPr>
+          <a:xfrm>
+            <a:off x="5220360" y="4176000"/>
+            <a:ext cx="216000" cy="216000"/>
+          </a:xfrm>
+          <a:prstGeom prst="ellipse">
+            <a:avLst/>
+          </a:prstGeom>
+          <a:solidFill>
+            <a:srgbClr val="99ff33"/>
+          </a:solidFill>
+          <a:ln>
+            <a:solidFill>
+              <a:srgbClr val="3465a4"/>
+            </a:solidFill>
+          </a:ln>
+        </p:spPr>
+        <p:style>
+          <a:lnRef idx="0"/>
+          <a:fillRef idx="0"/>
+          <a:effectRef idx="0"/>
+          <a:fontRef idx="minor"/>
+        </p:style>
+      </p:sp>
+      <p:sp>
+        <p:nvSpPr>
+          <p:cNvPr id="408" name="CustomShape 16"/>
+          <p:cNvSpPr/>
+          <p:nvPr/>
+        </p:nvSpPr>
+        <p:spPr>
+          <a:xfrm>
+            <a:off x="5508360" y="4104000"/>
+            <a:ext cx="216000" cy="216000"/>
+          </a:xfrm>
+          <a:prstGeom prst="ellipse">
+            <a:avLst/>
+          </a:prstGeom>
+          <a:solidFill>
+            <a:srgbClr val="99ff33"/>
+          </a:solidFill>
+          <a:ln>
+            <a:solidFill>
+              <a:srgbClr val="3465a4"/>
+            </a:solidFill>
+          </a:ln>
+        </p:spPr>
+        <p:style>
+          <a:lnRef idx="0"/>
+          <a:fillRef idx="0"/>
+          <a:effectRef idx="0"/>
+          <a:fontRef idx="minor"/>
+        </p:style>
+      </p:sp>
+      <p:sp>
+        <p:nvSpPr>
+          <p:cNvPr id="409" name="CustomShape 17"/>
+          <p:cNvSpPr/>
+          <p:nvPr/>
+        </p:nvSpPr>
+        <p:spPr>
+          <a:xfrm rot="20382000">
+            <a:off x="5088240" y="2376720"/>
+            <a:ext cx="2880000" cy="2520000"/>
+          </a:xfrm>
+          <a:prstGeom prst="parallelogram">
+            <a:avLst>
+              <a:gd name="adj" fmla="val 7081"/>
+            </a:avLst>
+          </a:prstGeom>
+          <a:solidFill>
+            <a:srgbClr val="729fcf">
+              <a:alpha val="50000"/>
+            </a:srgbClr>
+          </a:solidFill>
+          <a:ln>
+            <a:solidFill>
+              <a:srgbClr val="729fcf"/>
+            </a:solidFill>
+          </a:ln>
+        </p:spPr>
+        <p:style>
+          <a:lnRef idx="0"/>
+          <a:fillRef idx="0"/>
+          <a:effectRef idx="0"/>
+          <a:fontRef idx="minor"/>
+        </p:style>
+      </p:sp>
+      <p:sp>
+        <p:nvSpPr>
+          <p:cNvPr id="410" name="CustomShape 18"/>
+          <p:cNvSpPr/>
+          <p:nvPr/>
+        </p:nvSpPr>
+        <p:spPr>
+          <a:xfrm>
+            <a:off x="6156000" y="2772360"/>
+            <a:ext cx="216000" cy="216000"/>
+          </a:xfrm>
+          <a:prstGeom prst="ellipse">
+            <a:avLst/>
+          </a:prstGeom>
+          <a:solidFill>
+            <a:srgbClr val="ff420e"/>
+          </a:solidFill>
+          <a:ln>
+            <a:solidFill>
+              <a:srgbClr val="3465a4"/>
+            </a:solidFill>
+          </a:ln>
+        </p:spPr>
+        <p:style>
+          <a:lnRef idx="0"/>
+          <a:fillRef idx="0"/>
+          <a:effectRef idx="0"/>
+          <a:fontRef idx="minor"/>
+        </p:style>
+      </p:sp>
+      <p:sp>
+        <p:nvSpPr>
+          <p:cNvPr id="411" name="CustomShape 19"/>
+          <p:cNvSpPr/>
+          <p:nvPr/>
+        </p:nvSpPr>
+        <p:spPr>
+          <a:xfrm>
+            <a:off x="5796360" y="3780720"/>
+            <a:ext cx="216000" cy="216000"/>
+          </a:xfrm>
+          <a:prstGeom prst="ellipse">
+            <a:avLst/>
+          </a:prstGeom>
+          <a:solidFill>
+            <a:srgbClr val="ff420e"/>
+          </a:solidFill>
+          <a:ln>
+            <a:solidFill>
+              <a:srgbClr val="3465a4"/>
+            </a:solidFill>
+          </a:ln>
+        </p:spPr>
+        <p:style>
+          <a:lnRef idx="0"/>
+          <a:fillRef idx="0"/>
+          <a:effectRef idx="0"/>
+          <a:fontRef idx="minor"/>
+        </p:style>
+      </p:sp>
+      <p:sp>
+        <p:nvSpPr>
+          <p:cNvPr id="412" name="CustomShape 20"/>
+          <p:cNvSpPr/>
+          <p:nvPr/>
+        </p:nvSpPr>
+        <p:spPr>
+          <a:xfrm>
+            <a:off x="5904360" y="2808720"/>
+            <a:ext cx="216000" cy="216000"/>
+          </a:xfrm>
+          <a:prstGeom prst="ellipse">
+            <a:avLst/>
+          </a:prstGeom>
+          <a:solidFill>
+            <a:srgbClr val="ff420e"/>
+          </a:solidFill>
+          <a:ln>
+            <a:solidFill>
+              <a:srgbClr val="3465a4"/>
+            </a:solidFill>
+          </a:ln>
+        </p:spPr>
+        <p:style>
+          <a:lnRef idx="0"/>
+          <a:fillRef idx="0"/>
+          <a:effectRef idx="0"/>
+          <a:fontRef idx="minor"/>
+        </p:style>
+      </p:sp>
+      <p:sp>
+        <p:nvSpPr>
+          <p:cNvPr id="413" name="CustomShape 21"/>
+          <p:cNvSpPr/>
+          <p:nvPr/>
+        </p:nvSpPr>
+        <p:spPr>
+          <a:xfrm>
+            <a:off x="6948360" y="2843640"/>
+            <a:ext cx="216000" cy="216000"/>
+          </a:xfrm>
+          <a:prstGeom prst="ellipse">
+            <a:avLst/>
+          </a:prstGeom>
+          <a:solidFill>
+            <a:srgbClr val="99ff33"/>
+          </a:solidFill>
+          <a:ln>
+            <a:solidFill>
+              <a:srgbClr val="3465a4"/>
+            </a:solidFill>
+          </a:ln>
+        </p:spPr>
+        <p:style>
+          <a:lnRef idx="0"/>
+          <a:fillRef idx="0"/>
+          <a:effectRef idx="0"/>
+          <a:fontRef idx="minor"/>
+        </p:style>
+      </p:sp>
+      <p:sp>
+        <p:nvSpPr>
+          <p:cNvPr id="414" name="CustomShape 22"/>
+          <p:cNvSpPr/>
+          <p:nvPr/>
+        </p:nvSpPr>
+        <p:spPr>
+          <a:xfrm>
+            <a:off x="6588720" y="4176000"/>
+            <a:ext cx="216000" cy="216000"/>
+          </a:xfrm>
+          <a:prstGeom prst="ellipse">
+            <a:avLst/>
+          </a:prstGeom>
+          <a:solidFill>
+            <a:srgbClr val="99ff33"/>
+          </a:solidFill>
+          <a:ln>
+            <a:solidFill>
+              <a:srgbClr val="3465a4"/>
+            </a:solidFill>
+          </a:ln>
+        </p:spPr>
+        <p:style>
+          <a:lnRef idx="0"/>
+          <a:fillRef idx="0"/>
+          <a:effectRef idx="0"/>
+          <a:fontRef idx="minor"/>
+        </p:style>
+      </p:sp>
+      <p:sp>
+        <p:nvSpPr>
+          <p:cNvPr id="415" name="CustomShape 23"/>
+          <p:cNvSpPr/>
+          <p:nvPr/>
+        </p:nvSpPr>
+        <p:spPr>
+          <a:xfrm>
+            <a:off x="6876720" y="4104000"/>
+            <a:ext cx="216000" cy="216000"/>
+          </a:xfrm>
+          <a:prstGeom prst="ellipse">
+            <a:avLst/>
+          </a:prstGeom>
+          <a:solidFill>
+            <a:srgbClr val="99ff33"/>
+          </a:solidFill>
+          <a:ln>
+            <a:solidFill>
+              <a:srgbClr val="3465a4"/>
+            </a:solidFill>
+          </a:ln>
+        </p:spPr>
+        <p:style>
+          <a:lnRef idx="0"/>
+          <a:fillRef idx="0"/>
+          <a:effectRef idx="0"/>
+          <a:fontRef idx="minor"/>
+        </p:style>
+      </p:sp>
+      <p:sp>
+        <p:nvSpPr>
+          <p:cNvPr id="416" name="CustomShape 24"/>
+          <p:cNvSpPr/>
+          <p:nvPr/>
+        </p:nvSpPr>
+        <p:spPr>
+          <a:xfrm rot="20382000">
+            <a:off x="6528240" y="2376720"/>
+            <a:ext cx="2880000" cy="2520000"/>
+          </a:xfrm>
+          <a:prstGeom prst="parallelogram">
+            <a:avLst>
+              <a:gd name="adj" fmla="val 7081"/>
+            </a:avLst>
+          </a:prstGeom>
+          <a:solidFill>
+            <a:srgbClr val="729fcf">
+              <a:alpha val="50000"/>
+            </a:srgbClr>
+          </a:solidFill>
+          <a:ln>
+            <a:solidFill>
+              <a:srgbClr val="729fcf"/>
+            </a:solidFill>
+          </a:ln>
+        </p:spPr>
+        <p:style>
+          <a:lnRef idx="0"/>
+          <a:fillRef idx="0"/>
+          <a:effectRef idx="0"/>
+          <a:fontRef idx="minor"/>
+        </p:style>
+      </p:sp>
+      <p:sp>
+        <p:nvSpPr>
+          <p:cNvPr id="417" name="CustomShape 25"/>
+          <p:cNvSpPr/>
+          <p:nvPr/>
+        </p:nvSpPr>
+        <p:spPr>
+          <a:xfrm>
+            <a:off x="7596000" y="4248360"/>
+            <a:ext cx="216000" cy="216000"/>
+          </a:xfrm>
+          <a:prstGeom prst="ellipse">
+            <a:avLst/>
+          </a:prstGeom>
+          <a:solidFill>
+            <a:srgbClr val="ff420e"/>
+          </a:solidFill>
+          <a:ln>
+            <a:solidFill>
+              <a:srgbClr val="3465a4"/>
+            </a:solidFill>
+          </a:ln>
+        </p:spPr>
+        <p:style>
+          <a:lnRef idx="0"/>
+          <a:fillRef idx="0"/>
+          <a:effectRef idx="0"/>
+          <a:fontRef idx="minor"/>
+        </p:style>
+      </p:sp>
+      <p:sp>
+        <p:nvSpPr>
+          <p:cNvPr id="418" name="CustomShape 26"/>
+          <p:cNvSpPr/>
+          <p:nvPr/>
+        </p:nvSpPr>
+        <p:spPr>
+          <a:xfrm>
+            <a:off x="7236360" y="2916720"/>
+            <a:ext cx="216000" cy="216000"/>
+          </a:xfrm>
+          <a:prstGeom prst="ellipse">
+            <a:avLst/>
+          </a:prstGeom>
+          <a:solidFill>
+            <a:srgbClr val="ff420e"/>
+          </a:solidFill>
+          <a:ln>
+            <a:solidFill>
+              <a:srgbClr val="3465a4"/>
+            </a:solidFill>
+          </a:ln>
+        </p:spPr>
+        <p:style>
+          <a:lnRef idx="0"/>
+          <a:fillRef idx="0"/>
+          <a:effectRef idx="0"/>
+          <a:fontRef idx="minor"/>
+        </p:style>
+      </p:sp>
+      <p:sp>
+        <p:nvSpPr>
+          <p:cNvPr id="419" name="CustomShape 27"/>
+          <p:cNvSpPr/>
+          <p:nvPr/>
+        </p:nvSpPr>
+        <p:spPr>
+          <a:xfrm>
+            <a:off x="7344360" y="2808720"/>
+            <a:ext cx="216000" cy="216000"/>
+          </a:xfrm>
+          <a:prstGeom prst="ellipse">
+            <a:avLst/>
+          </a:prstGeom>
+          <a:solidFill>
+            <a:srgbClr val="ff420e"/>
+          </a:solidFill>
+          <a:ln>
+            <a:solidFill>
+              <a:srgbClr val="3465a4"/>
+            </a:solidFill>
+          </a:ln>
+        </p:spPr>
+        <p:style>
+          <a:lnRef idx="0"/>
+          <a:fillRef idx="0"/>
+          <a:effectRef idx="0"/>
+          <a:fontRef idx="minor"/>
+        </p:style>
+      </p:sp>
+      <p:sp>
+        <p:nvSpPr>
+          <p:cNvPr id="420" name="CustomShape 28"/>
+          <p:cNvSpPr/>
+          <p:nvPr/>
+        </p:nvSpPr>
+        <p:spPr>
+          <a:xfrm>
+            <a:off x="8388360" y="2951640"/>
+            <a:ext cx="216000" cy="216000"/>
+          </a:xfrm>
+          <a:prstGeom prst="ellipse">
+            <a:avLst/>
+          </a:prstGeom>
+          <a:solidFill>
+            <a:srgbClr val="99ff33"/>
+          </a:solidFill>
+          <a:ln>
+            <a:solidFill>
+              <a:srgbClr val="3465a4"/>
+            </a:solidFill>
+          </a:ln>
+        </p:spPr>
+        <p:style>
+          <a:lnRef idx="0"/>
+          <a:fillRef idx="0"/>
+          <a:effectRef idx="0"/>
+          <a:fontRef idx="minor"/>
+        </p:style>
+      </p:sp>
+      <p:sp>
+        <p:nvSpPr>
+          <p:cNvPr id="421" name="CustomShape 29"/>
+          <p:cNvSpPr/>
+          <p:nvPr/>
+        </p:nvSpPr>
+        <p:spPr>
+          <a:xfrm>
+            <a:off x="8028720" y="4176000"/>
+            <a:ext cx="216000" cy="216000"/>
+          </a:xfrm>
+          <a:prstGeom prst="ellipse">
+            <a:avLst/>
+          </a:prstGeom>
+          <a:solidFill>
+            <a:srgbClr val="99ff33"/>
+          </a:solidFill>
+          <a:ln>
+            <a:solidFill>
+              <a:srgbClr val="3465a4"/>
+            </a:solidFill>
+          </a:ln>
+        </p:spPr>
+        <p:style>
+          <a:lnRef idx="0"/>
+          <a:fillRef idx="0"/>
+          <a:effectRef idx="0"/>
+          <a:fontRef idx="minor"/>
+        </p:style>
+      </p:sp>
+      <p:sp>
+        <p:nvSpPr>
+          <p:cNvPr id="422" name="CustomShape 30"/>
+          <p:cNvSpPr/>
+          <p:nvPr/>
+        </p:nvSpPr>
+        <p:spPr>
+          <a:xfrm>
+            <a:off x="8316720" y="2772000"/>
+            <a:ext cx="216000" cy="216000"/>
+          </a:xfrm>
+          <a:prstGeom prst="ellipse">
+            <a:avLst/>
+          </a:prstGeom>
+          <a:solidFill>
+            <a:srgbClr val="99ff33"/>
+          </a:solidFill>
+          <a:ln>
+            <a:solidFill>
+              <a:srgbClr val="3465a4"/>
+            </a:solidFill>
+          </a:ln>
+        </p:spPr>
+        <p:style>
+          <a:lnRef idx="0"/>
+          <a:fillRef idx="0"/>
+          <a:effectRef idx="0"/>
+          <a:fontRef idx="minor"/>
+        </p:style>
+      </p:sp>
+      <p:sp>
+        <p:nvSpPr>
+          <p:cNvPr id="423" name="TextShape 31"/>
+          <p:cNvSpPr txBox="1"/>
+          <p:nvPr/>
+        </p:nvSpPr>
+        <p:spPr>
+          <a:xfrm>
+            <a:off x="900000" y="3672000"/>
+            <a:ext cx="2346480" cy="602280"/>
+          </a:xfrm>
+          <a:prstGeom prst="rect">
+            <a:avLst/>
+          </a:prstGeom>
+          <a:noFill/>
+          <a:ln>
+            <a:noFill/>
+          </a:ln>
+        </p:spPr>
+        <p:txBody>
+          <a:bodyPr lIns="90000" rIns="90000" tIns="45000" bIns="45000"/>
+          <a:p>
+            <a:r>
+              <a:rPr lang="en-US">
+                <a:latin typeface="Arial"/>
+              </a:rPr>
+              <a:t>Using agglomerative </a:t>
+            </a:r>
+            <a:endParaRPr/>
+          </a:p>
+          <a:p>
+            <a:r>
+              <a:rPr lang="en-US">
+                <a:latin typeface="Arial"/>
+              </a:rPr>
+              <a:t>hierarchical algorithm</a:t>
+            </a:r>
+            <a:endParaRPr/>
+          </a:p>
+        </p:txBody>
+      </p:sp>
+      <p:sp>
+        <p:nvSpPr>
+          <p:cNvPr id="424" name="Line 32"/>
+          <p:cNvSpPr/>
+          <p:nvPr/>
+        </p:nvSpPr>
+        <p:spPr>
+          <a:xfrm flipV="1">
+            <a:off x="2880000" y="3240000"/>
+            <a:ext cx="1476000" cy="432000"/>
+          </a:xfrm>
+          <a:prstGeom prst="line">
+            <a:avLst/>
+          </a:prstGeom>
+          <a:ln w="29160">
+            <a:solidFill>
+              <a:srgbClr val="c5000b"/>
+            </a:solidFill>
+            <a:round/>
+            <a:tailEnd len="med" type="triangle" w="med"/>
+          </a:ln>
+        </p:spPr>
+      </p:sp>
+      <p:sp>
+        <p:nvSpPr>
+          <p:cNvPr id="425" name="CustomShape 33"/>
+          <p:cNvSpPr/>
+          <p:nvPr/>
+        </p:nvSpPr>
+        <p:spPr>
+          <a:xfrm>
+            <a:off x="4356000" y="2664000"/>
+            <a:ext cx="684000" cy="1080000"/>
+          </a:xfrm>
+          <a:prstGeom prst="ellipse">
+            <a:avLst/>
+          </a:prstGeom>
+          <a:noFill/>
+          <a:ln>
+            <a:solidFill>
+              <a:srgbClr val="c5000b"/>
+            </a:solidFill>
+          </a:ln>
+        </p:spPr>
+        <p:style>
+          <a:lnRef idx="0"/>
+          <a:fillRef idx="0"/>
+          <a:effectRef idx="0"/>
+          <a:fontRef idx="minor"/>
+        </p:style>
       </p:sp>
     </p:spTree>
   </p:cSld>
@@ -12965,7 +14039,7 @@
       </p:grpSpPr>
       <p:sp>
         <p:nvSpPr>
-          <p:cNvPr id="397" name="TextShape 1"/>
+          <p:cNvPr id="426" name="TextShape 1"/>
           <p:cNvSpPr txBox="1"/>
           <p:nvPr/>
         </p:nvSpPr>
@@ -12997,22 +14071,85 @@
                 </a:solidFill>
                 <a:latin typeface="Calibri"/>
               </a:rPr>
-              <a:t>One Step Further</a:t>
-            </a:r>
-            <a:endParaRPr/>
-          </a:p>
-        </p:txBody>
-      </p:sp>
-      <p:sp>
-        <p:nvSpPr>
-          <p:cNvPr id="398" name="TextShape 2"/>
+              <a:t>Case Study 1: </a:t>
+            </a:r>
+            <a:r>
+              <a:rPr lang="en-US" sz="2800" strike="noStrike">
+                <a:solidFill>
+                  <a:srgbClr val="cc0000"/>
+                </a:solidFill>
+                <a:latin typeface="Calibri"/>
+              </a:rPr>
+              <a:t>Portuguese</a:t>
+            </a:r>
+            <a:r>
+              <a:rPr lang="de-DE" sz="2800" strike="noStrike">
+                <a:solidFill>
+                  <a:srgbClr val="cc0000"/>
+                </a:solidFill>
+                <a:latin typeface="Calibri"/>
+              </a:rPr>
+              <a:t> </a:t>
+            </a:r>
+            <a:r>
+              <a:rPr lang="en-US" sz="2800" strike="noStrike">
+                <a:solidFill>
+                  <a:srgbClr val="cc0000"/>
+                </a:solidFill>
+                <a:latin typeface="Calibri"/>
+              </a:rPr>
+              <a:t>Activity</a:t>
+            </a:r>
+            <a:r>
+              <a:rPr lang="de-DE" sz="2800" strike="noStrike">
+                <a:solidFill>
+                  <a:srgbClr val="cc0000"/>
+                </a:solidFill>
+                <a:latin typeface="Calibri"/>
+              </a:rPr>
+              <a:t> </a:t>
+            </a:r>
+            <a:r>
+              <a:rPr lang="en-US" sz="2800" strike="noStrike">
+                <a:solidFill>
+                  <a:srgbClr val="cc0000"/>
+                </a:solidFill>
+                <a:latin typeface="Calibri"/>
+              </a:rPr>
+              <a:t>Sectors</a:t>
+            </a:r>
+            <a:r>
+              <a:rPr lang="de-DE" sz="2800" strike="noStrike">
+                <a:solidFill>
+                  <a:srgbClr val="cc0000"/>
+                </a:solidFill>
+                <a:latin typeface="Calibri"/>
+              </a:rPr>
+              <a:t> – </a:t>
+            </a:r>
+            <a:r>
+              <a:rPr lang="en-US" sz="2800" strike="noStrike">
+                <a:solidFill>
+                  <a:srgbClr val="cc0000"/>
+                </a:solidFill>
+                <a:latin typeface="Calibri"/>
+              </a:rPr>
+              <a:t>Result</a:t>
+            </a:r>
+            <a:endParaRPr/>
+          </a:p>
+        </p:txBody>
+      </p:sp>
+      <p:sp>
+        <p:nvSpPr>
+          <p:cNvPr id="427" name="TextShape 2"/>
           <p:cNvSpPr txBox="1"/>
           <p:nvPr/>
         </p:nvSpPr>
         <p:spPr>
           <a:xfrm>
-            <a:off x="609480" y="1295280"/>
-            <a:ext cx="10972440" cy="5105160"/>
+            <a:off x="8727120" y="6400800"/>
+            <a:ext cx="2844360" cy="456840"/>
           </a:xfrm>
           <a:prstGeom prst="rect">
             <a:avLst/>
@@ -13023,107 +14160,6 @@
           </a:ln>
         </p:spPr>
         <p:txBody>
-          <a:bodyPr/>
-          <a:p>
-            <a:pPr>
-              <a:lnSpc>
-                <a:spcPct val="100000"/>
-              </a:lnSpc>
-              <a:buSzPct val="65000"/>
-              <a:buFont typeface="Wingdings" charset="2"/>
-              <a:buChar char=""/>
-            </a:pPr>
-            <a:r>
-              <a:rPr lang="de-DE" sz="2800" strike="noStrike">
-                <a:solidFill>
-                  <a:srgbClr val="808080"/>
-                </a:solidFill>
-                <a:latin typeface="Calibri"/>
-              </a:rPr>
-              <a:t>Application on Fuzzy Clustering...</a:t>
-            </a:r>
-            <a:endParaRPr/>
-          </a:p>
-          <a:p>
-            <a:pPr>
-              <a:lnSpc>
-                <a:spcPct val="100000"/>
-              </a:lnSpc>
-            </a:pPr>
-            <a:r>
-              <a:rPr lang="de-DE" sz="2800" strike="noStrike">
-                <a:solidFill>
-                  <a:srgbClr val="808080"/>
-                </a:solidFill>
-                <a:latin typeface="Calibri"/>
-              </a:rPr>
-              <a:t>for the formuler:</a:t>
-            </a:r>
-            <a:endParaRPr/>
-          </a:p>
-          <a:p>
-            <a:pPr>
-              <a:lnSpc>
-                <a:spcPct val="100000"/>
-              </a:lnSpc>
-            </a:pPr>
-            <a:endParaRPr/>
-          </a:p>
-          <a:p>
-            <a:pPr>
-              <a:lnSpc>
-                <a:spcPct val="100000"/>
-              </a:lnSpc>
-            </a:pPr>
-            <a:endParaRPr/>
-          </a:p>
-          <a:p>
-            <a:pPr>
-              <a:lnSpc>
-                <a:spcPct val="100000"/>
-              </a:lnSpc>
-            </a:pPr>
-            <a:r>
-              <a:rPr lang="de-DE" sz="2800" strike="noStrike">
-                <a:solidFill>
-                  <a:srgbClr val="808080"/>
-                </a:solidFill>
-                <a:latin typeface="Calibri"/>
-              </a:rPr>
-              <a:t>re-define the defination of intersection and join, such as:</a:t>
-            </a:r>
-            <a:endParaRPr/>
-          </a:p>
-          <a:p>
-            <a:pPr>
-              <a:lnSpc>
-                <a:spcPct val="100000"/>
-              </a:lnSpc>
-            </a:pPr>
-            <a:endParaRPr/>
-          </a:p>
-        </p:txBody>
-      </p:sp>
-      <p:sp>
-        <p:nvSpPr>
-          <p:cNvPr id="399" name="TextShape 3"/>
-          <p:cNvSpPr txBox="1"/>
-          <p:nvPr/>
-        </p:nvSpPr>
-        <p:spPr>
-          <a:xfrm>
-            <a:off x="8727120" y="6400800"/>
-            <a:ext cx="2844360" cy="456840"/>
-          </a:xfrm>
-          <a:prstGeom prst="rect">
-            <a:avLst/>
-          </a:prstGeom>
-          <a:noFill/>
-          <a:ln w="9360">
-            <a:noFill/>
-          </a:ln>
-        </p:spPr>
-        <p:txBody>
           <a:bodyPr anchor="b"/>
           <a:p>
             <a:endParaRPr/>
@@ -13132,7 +14168,7 @@
       </p:sp>
       <p:sp>
         <p:nvSpPr>
-          <p:cNvPr id="400" name="TextShape 4"/>
+          <p:cNvPr id="428" name="TextShape 3"/>
           <p:cNvSpPr txBox="1"/>
           <p:nvPr/>
         </p:nvSpPr>
@@ -13175,7 +14211,7 @@
       </p:sp>
       <p:pic>
         <p:nvPicPr>
-          <p:cNvPr id="401" name="" descr=""/>
+          <p:cNvPr id="429" name="" descr=""/>
           <p:cNvPicPr/>
           <p:nvPr/>
         </p:nvPicPr>
@@ -13185,8 +14221,8 @@
         </p:blipFill>
         <p:spPr>
           <a:xfrm>
-            <a:off x="704160" y="2577600"/>
-            <a:ext cx="10765800" cy="940320"/>
+            <a:off x="1294560" y="1296000"/>
+            <a:ext cx="9433440" cy="4930560"/>
           </a:xfrm>
           <a:prstGeom prst="rect">
             <a:avLst/>
@@ -13196,29 +14232,416 @@
           </a:ln>
         </p:spPr>
       </p:pic>
-      <p:pic>
-        <p:nvPicPr>
-          <p:cNvPr id="402" name="" descr=""/>
-          <p:cNvPicPr/>
-          <p:nvPr/>
-        </p:nvPicPr>
-        <p:blipFill>
-          <a:blip r:embed="rId2"/>
-          <a:stretch/>
-        </p:blipFill>
-        <p:spPr>
-          <a:xfrm>
-            <a:off x="4217040" y="4660920"/>
-            <a:ext cx="3961800" cy="1104840"/>
-          </a:xfrm>
-          <a:prstGeom prst="rect">
-            <a:avLst/>
-          </a:prstGeom>
+      <p:sp>
+        <p:nvSpPr>
+          <p:cNvPr id="430" name="TextShape 4"/>
+          <p:cNvSpPr txBox="1"/>
+          <p:nvPr/>
+        </p:nvSpPr>
+        <p:spPr>
+          <a:xfrm>
+            <a:off x="2196000" y="1728000"/>
+            <a:ext cx="1622520" cy="858240"/>
+          </a:xfrm>
+          <a:prstGeom prst="rect">
+            <a:avLst/>
+          </a:prstGeom>
+          <a:noFill/>
           <a:ln>
             <a:noFill/>
           </a:ln>
         </p:spPr>
-      </p:pic>
+        <p:txBody>
+          <a:bodyPr lIns="90000" rIns="90000" tIns="45000" bIns="45000"/>
+          <a:p>
+            <a:r>
+              <a:rPr lang="en-US">
+                <a:latin typeface="Arial"/>
+              </a:rPr>
+              <a:t>Fishing</a:t>
+            </a:r>
+            <a:endParaRPr/>
+          </a:p>
+          <a:p>
+            <a:r>
+              <a:rPr lang="en-US">
+                <a:latin typeface="Arial"/>
+              </a:rPr>
+              <a:t>Manufacturing</a:t>
+            </a:r>
+            <a:endParaRPr/>
+          </a:p>
+          <a:p>
+            <a:r>
+              <a:rPr lang="en-US">
+                <a:latin typeface="Arial"/>
+              </a:rPr>
+              <a:t>...</a:t>
+            </a:r>
+            <a:endParaRPr/>
+          </a:p>
+        </p:txBody>
+      </p:sp>
+      <p:sp>
+        <p:nvSpPr>
+          <p:cNvPr id="431" name="TextShape 5"/>
+          <p:cNvSpPr txBox="1"/>
+          <p:nvPr/>
+        </p:nvSpPr>
+        <p:spPr>
+          <a:xfrm>
+            <a:off x="792000" y="2921760"/>
+            <a:ext cx="2658600" cy="858240"/>
+          </a:xfrm>
+          <a:prstGeom prst="rect">
+            <a:avLst/>
+          </a:prstGeom>
+          <a:noFill/>
+          <a:ln>
+            <a:noFill/>
+          </a:ln>
+        </p:spPr>
+        <p:txBody>
+          <a:bodyPr lIns="90000" rIns="90000" tIns="45000" bIns="45000"/>
+          <a:p>
+            <a:r>
+              <a:rPr lang="en-US">
+                <a:latin typeface="Arial"/>
+              </a:rPr>
+              <a:t>Production and </a:t>
+            </a:r>
+            <a:endParaRPr/>
+          </a:p>
+          <a:p>
+            <a:r>
+              <a:rPr lang="en-US">
+                <a:latin typeface="Arial"/>
+              </a:rPr>
+              <a:t>distribution of electricity, </a:t>
+            </a:r>
+            <a:endParaRPr/>
+          </a:p>
+          <a:p>
+            <a:r>
+              <a:rPr lang="en-US">
+                <a:latin typeface="Arial"/>
+              </a:rPr>
+              <a:t>gas and water</a:t>
+            </a:r>
+            <a:endParaRPr/>
+          </a:p>
+        </p:txBody>
+      </p:sp>
+      <p:sp>
+        <p:nvSpPr>
+          <p:cNvPr id="432" name="TextShape 6"/>
+          <p:cNvSpPr txBox="1"/>
+          <p:nvPr/>
+        </p:nvSpPr>
+        <p:spPr>
+          <a:xfrm>
+            <a:off x="2304000" y="5544000"/>
+            <a:ext cx="1460880" cy="832320"/>
+          </a:xfrm>
+          <a:prstGeom prst="rect">
+            <a:avLst/>
+          </a:prstGeom>
+          <a:noFill/>
+          <a:ln>
+            <a:noFill/>
+          </a:ln>
+        </p:spPr>
+        <p:txBody>
+          <a:bodyPr lIns="90000" rIns="90000" tIns="45000" bIns="45000"/>
+          <a:p>
+            <a:r>
+              <a:rPr lang="en-US">
+                <a:latin typeface="Arial"/>
+              </a:rPr>
+              <a:t>Construction</a:t>
+            </a:r>
+            <a:endParaRPr/>
+          </a:p>
+          <a:p>
+            <a:r>
+              <a:rPr lang="en-US">
+                <a:latin typeface="Arial"/>
+              </a:rPr>
+              <a:t>Education</a:t>
+            </a:r>
+            <a:endParaRPr/>
+          </a:p>
+          <a:p>
+            <a:r>
+              <a:rPr lang="en-US">
+                <a:latin typeface="Arial"/>
+              </a:rPr>
+              <a:t>…</a:t>
+            </a:r>
+            <a:endParaRPr/>
+          </a:p>
+        </p:txBody>
+      </p:sp>
+      <p:sp>
+        <p:nvSpPr>
+          <p:cNvPr id="433" name="TextShape 7"/>
+          <p:cNvSpPr txBox="1"/>
+          <p:nvPr/>
+        </p:nvSpPr>
+        <p:spPr>
+          <a:xfrm>
+            <a:off x="6413400" y="1063800"/>
+            <a:ext cx="2658600" cy="1600200"/>
+          </a:xfrm>
+          <a:prstGeom prst="rect">
+            <a:avLst/>
+          </a:prstGeom>
+          <a:noFill/>
+          <a:ln>
+            <a:noFill/>
+          </a:ln>
+        </p:spPr>
+        <p:txBody>
+          <a:bodyPr lIns="90000" rIns="90000" tIns="45000" bIns="45000"/>
+          <a:p>
+            <a:r>
+              <a:rPr lang="en-US">
+                <a:latin typeface="Arial"/>
+              </a:rPr>
+              <a:t>Fishing</a:t>
+            </a:r>
+            <a:endParaRPr/>
+          </a:p>
+          <a:p>
+            <a:endParaRPr/>
+          </a:p>
+          <a:p>
+            <a:r>
+              <a:rPr lang="en-US">
+                <a:latin typeface="Arial"/>
+              </a:rPr>
+              <a:t>Production and </a:t>
+            </a:r>
+            <a:endParaRPr/>
+          </a:p>
+          <a:p>
+            <a:r>
+              <a:rPr lang="en-US">
+                <a:latin typeface="Arial"/>
+              </a:rPr>
+              <a:t>distribution of electricity, </a:t>
+            </a:r>
+            <a:endParaRPr/>
+          </a:p>
+          <a:p>
+            <a:r>
+              <a:rPr lang="en-US">
+                <a:latin typeface="Arial"/>
+              </a:rPr>
+              <a:t>gas and water</a:t>
+            </a:r>
+            <a:endParaRPr/>
+          </a:p>
+          <a:p>
+            <a:r>
+              <a:rPr lang="en-US">
+                <a:latin typeface="Arial"/>
+              </a:rPr>
+              <a:t>...</a:t>
+            </a:r>
+            <a:endParaRPr/>
+          </a:p>
+        </p:txBody>
+      </p:sp>
+      <p:sp>
+        <p:nvSpPr>
+          <p:cNvPr id="434" name="TextShape 8"/>
+          <p:cNvSpPr txBox="1"/>
+          <p:nvPr/>
+        </p:nvSpPr>
+        <p:spPr>
+          <a:xfrm>
+            <a:off x="5073480" y="4536000"/>
+            <a:ext cx="1622520" cy="1114200"/>
+          </a:xfrm>
+          <a:prstGeom prst="rect">
+            <a:avLst/>
+          </a:prstGeom>
+          <a:noFill/>
+          <a:ln>
+            <a:noFill/>
+          </a:ln>
+        </p:spPr>
+        <p:txBody>
+          <a:bodyPr lIns="90000" rIns="90000" tIns="45000" bIns="45000"/>
+          <a:p>
+            <a:r>
+              <a:rPr lang="en-US">
+                <a:latin typeface="Arial"/>
+              </a:rPr>
+              <a:t>Manufacturing</a:t>
+            </a:r>
+            <a:endParaRPr/>
+          </a:p>
+          <a:p>
+            <a:r>
+              <a:rPr lang="en-US">
+                <a:latin typeface="Arial"/>
+              </a:rPr>
+              <a:t>Construction</a:t>
+            </a:r>
+            <a:endParaRPr/>
+          </a:p>
+          <a:p>
+            <a:r>
+              <a:rPr lang="en-US">
+                <a:latin typeface="Arial"/>
+              </a:rPr>
+              <a:t>Education</a:t>
+            </a:r>
+            <a:endParaRPr/>
+          </a:p>
+          <a:p>
+            <a:r>
+              <a:rPr lang="en-US">
+                <a:latin typeface="Arial"/>
+              </a:rPr>
+              <a:t>...</a:t>
+            </a:r>
+            <a:endParaRPr/>
+          </a:p>
+        </p:txBody>
+      </p:sp>
+      <p:sp>
+        <p:nvSpPr>
+          <p:cNvPr id="435" name="TextShape 9"/>
+          <p:cNvSpPr txBox="1"/>
+          <p:nvPr/>
+        </p:nvSpPr>
+        <p:spPr>
+          <a:xfrm>
+            <a:off x="10368000" y="1944000"/>
+            <a:ext cx="1622520" cy="1114200"/>
+          </a:xfrm>
+          <a:prstGeom prst="rect">
+            <a:avLst/>
+          </a:prstGeom>
+          <a:noFill/>
+          <a:ln>
+            <a:noFill/>
+          </a:ln>
+        </p:spPr>
+        <p:txBody>
+          <a:bodyPr lIns="90000" rIns="90000" tIns="45000" bIns="45000"/>
+          <a:p>
+            <a:r>
+              <a:rPr lang="en-US">
+                <a:latin typeface="Arial"/>
+              </a:rPr>
+              <a:t>Fishing</a:t>
+            </a:r>
+            <a:endParaRPr/>
+          </a:p>
+          <a:p>
+            <a:r>
+              <a:rPr lang="en-US">
+                <a:latin typeface="Arial"/>
+              </a:rPr>
+              <a:t>Manufacturing</a:t>
+            </a:r>
+            <a:endParaRPr/>
+          </a:p>
+          <a:p>
+            <a:r>
+              <a:rPr lang="en-US">
+                <a:latin typeface="Arial"/>
+              </a:rPr>
+              <a:t>Education</a:t>
+            </a:r>
+            <a:endParaRPr/>
+          </a:p>
+          <a:p>
+            <a:r>
+              <a:rPr lang="en-US">
+                <a:latin typeface="Arial"/>
+              </a:rPr>
+              <a:t>...</a:t>
+            </a:r>
+            <a:endParaRPr/>
+          </a:p>
+        </p:txBody>
+      </p:sp>
+      <p:sp>
+        <p:nvSpPr>
+          <p:cNvPr id="436" name="TextShape 10"/>
+          <p:cNvSpPr txBox="1"/>
+          <p:nvPr/>
+        </p:nvSpPr>
+        <p:spPr>
+          <a:xfrm>
+            <a:off x="9339120" y="4536000"/>
+            <a:ext cx="2632680" cy="1600200"/>
+          </a:xfrm>
+          <a:prstGeom prst="rect">
+            <a:avLst/>
+          </a:prstGeom>
+          <a:noFill/>
+          <a:ln>
+            <a:noFill/>
+          </a:ln>
+        </p:spPr>
+        <p:txBody>
+          <a:bodyPr lIns="90000" rIns="90000" tIns="45000" bIns="45000"/>
+          <a:p>
+            <a:r>
+              <a:rPr lang="en-US">
+                <a:latin typeface="Arial"/>
+              </a:rPr>
+              <a:t>Construction</a:t>
+            </a:r>
+            <a:endParaRPr/>
+          </a:p>
+          <a:p>
+            <a:endParaRPr/>
+          </a:p>
+          <a:p>
+            <a:r>
+              <a:rPr lang="en-US">
+                <a:latin typeface="Arial"/>
+              </a:rPr>
+              <a:t>Production and </a:t>
+            </a:r>
+            <a:endParaRPr/>
+          </a:p>
+          <a:p>
+            <a:r>
+              <a:rPr lang="en-US">
+                <a:latin typeface="Arial"/>
+              </a:rPr>
+              <a:t>Distribution of electricity,</a:t>
+            </a:r>
+            <a:endParaRPr/>
+          </a:p>
+          <a:p>
+            <a:r>
+              <a:rPr lang="en-US">
+                <a:latin typeface="Arial"/>
+              </a:rPr>
+              <a:t>Gas and water</a:t>
+            </a:r>
+            <a:endParaRPr/>
+          </a:p>
+          <a:p>
+            <a:r>
+              <a:rPr lang="en-US">
+                <a:latin typeface="Arial"/>
+              </a:rPr>
+              <a:t>...</a:t>
+            </a:r>
+            <a:endParaRPr/>
+          </a:p>
+        </p:txBody>
+      </p:sp>
     </p:spTree>
   </p:cSld>
   <p:timing>
@@ -13270,7 +14693,7 @@
       </p:grpSpPr>
       <p:sp>
         <p:nvSpPr>
-          <p:cNvPr id="403" name="TextShape 1"/>
+          <p:cNvPr id="437" name="TextShape 1"/>
           <p:cNvSpPr txBox="1"/>
           <p:nvPr/>
         </p:nvSpPr>
@@ -13302,22 +14725,22 @@
                 </a:solidFill>
                 <a:latin typeface="Calibri"/>
               </a:rPr>
-              <a:t>Acknowledgement</a:t>
-            </a:r>
-            <a:endParaRPr/>
-          </a:p>
-        </p:txBody>
-      </p:sp>
-      <p:sp>
-        <p:nvSpPr>
-          <p:cNvPr id="404" name="TextShape 2"/>
+              <a:t>Case Study 2: European Companies</a:t>
+            </a:r>
+            <a:endParaRPr/>
+          </a:p>
+        </p:txBody>
+      </p:sp>
+      <p:sp>
+        <p:nvSpPr>
+          <p:cNvPr id="438" name="TextShape 2"/>
           <p:cNvSpPr txBox="1"/>
           <p:nvPr/>
         </p:nvSpPr>
         <p:spPr>
           <a:xfrm>
-            <a:off x="609480" y="1295280"/>
-            <a:ext cx="10972440" cy="5105160"/>
+            <a:off x="8727120" y="6400800"/>
+            <a:ext cx="2844360" cy="456840"/>
           </a:xfrm>
           <a:prstGeom prst="rect">
             <a:avLst/>
@@ -13328,88 +14751,6 @@
           </a:ln>
         </p:spPr>
         <p:txBody>
-          <a:bodyPr/>
-          <a:p>
-            <a:pPr algn="ctr">
-              <a:lnSpc>
-                <a:spcPct val="100000"/>
-              </a:lnSpc>
-            </a:pPr>
-            <a:endParaRPr/>
-          </a:p>
-          <a:p>
-            <a:pPr algn="ctr">
-              <a:lnSpc>
-                <a:spcPct val="100000"/>
-              </a:lnSpc>
-            </a:pPr>
-            <a:r>
-              <a:rPr lang="de-DE" sz="3600" strike="noStrike">
-                <a:solidFill>
-                  <a:srgbClr val="000000"/>
-                </a:solidFill>
-                <a:latin typeface="Calibri"/>
-              </a:rPr>
-              <a:t>Thank you for your attention.</a:t>
-            </a:r>
-            <a:endParaRPr/>
-          </a:p>
-          <a:p>
-            <a:pPr algn="ctr">
-              <a:lnSpc>
-                <a:spcPct val="100000"/>
-              </a:lnSpc>
-            </a:pPr>
-            <a:r>
-              <a:rPr lang="de-DE" sz="3600" strike="noStrike">
-                <a:solidFill>
-                  <a:srgbClr val="000000"/>
-                </a:solidFill>
-                <a:latin typeface="Calibri"/>
-              </a:rPr>
-              <a:t>Feel free to raise questions to me.</a:t>
-            </a:r>
-            <a:endParaRPr/>
-          </a:p>
-          <a:p>
-            <a:pPr algn="ctr">
-              <a:lnSpc>
-                <a:spcPct val="100000"/>
-              </a:lnSpc>
-            </a:pPr>
-            <a:r>
-              <a:rPr lang="de-DE" sz="3600" strike="noStrike">
-                <a:solidFill>
-                  <a:srgbClr val="000000"/>
-                </a:solidFill>
-                <a:latin typeface="Calibri"/>
-              </a:rPr>
-              <a:t>Have fun in following presentations.</a:t>
-            </a:r>
-            <a:endParaRPr/>
-          </a:p>
-        </p:txBody>
-      </p:sp>
-      <p:sp>
-        <p:nvSpPr>
-          <p:cNvPr id="405" name="TextShape 3"/>
-          <p:cNvSpPr txBox="1"/>
-          <p:nvPr/>
-        </p:nvSpPr>
-        <p:spPr>
-          <a:xfrm>
-            <a:off x="8727120" y="6400800"/>
-            <a:ext cx="2844360" cy="456840"/>
-          </a:xfrm>
-          <a:prstGeom prst="rect">
-            <a:avLst/>
-          </a:prstGeom>
-          <a:noFill/>
-          <a:ln w="9360">
-            <a:noFill/>
-          </a:ln>
-        </p:spPr>
-        <p:txBody>
           <a:bodyPr anchor="b"/>
           <a:p>
             <a:endParaRPr/>
@@ -13418,7 +14759,7 @@
       </p:sp>
       <p:sp>
         <p:nvSpPr>
-          <p:cNvPr id="406" name="TextShape 4"/>
+          <p:cNvPr id="439" name="TextShape 3"/>
           <p:cNvSpPr txBox="1"/>
           <p:nvPr/>
         </p:nvSpPr>
@@ -13454,6 +14795,91 @@
                 <a:latin typeface="Calibri"/>
               </a:rPr>
               <a:t>Present, Papers titlte</a:t>
+            </a:r>
+            <a:endParaRPr/>
+          </a:p>
+        </p:txBody>
+      </p:sp>
+      <p:sp>
+        <p:nvSpPr>
+          <p:cNvPr id="440" name="Line 4"/>
+          <p:cNvSpPr/>
+          <p:nvPr/>
+        </p:nvSpPr>
+        <p:spPr>
+          <a:xfrm flipV="1">
+            <a:off x="8254800" y="3965760"/>
+            <a:ext cx="1224000" cy="1152000"/>
+          </a:xfrm>
+          <a:prstGeom prst="line">
+            <a:avLst/>
+          </a:prstGeom>
+          <a:ln w="57240">
+            <a:solidFill>
+              <a:srgbClr val="ffcc99"/>
+            </a:solidFill>
+            <a:custDash>
+              <a:ds d="100000" sp="100000"/>
+            </a:custDash>
+            <a:round/>
+            <a:tailEnd len="med" type="triangle" w="med"/>
+          </a:ln>
+        </p:spPr>
+      </p:sp>
+      <p:sp>
+        <p:nvSpPr>
+          <p:cNvPr id="441" name="TextShape 5"/>
+          <p:cNvSpPr txBox="1"/>
+          <p:nvPr/>
+        </p:nvSpPr>
+        <p:spPr>
+          <a:xfrm>
+            <a:off x="5904000" y="5189760"/>
+            <a:ext cx="5878800" cy="1027800"/>
+          </a:xfrm>
+          <a:prstGeom prst="rect">
+            <a:avLst/>
+          </a:prstGeom>
+          <a:noFill/>
+          <a:ln>
+            <a:noFill/>
+          </a:ln>
+        </p:spPr>
+        <p:txBody>
+          <a:bodyPr lIns="90000" rIns="90000" tIns="45000" bIns="45000"/>
+          <a:p>
+            <a:r>
+              <a:rPr b="1" lang="en-US" sz="2200">
+                <a:solidFill>
+                  <a:srgbClr val="9999ff"/>
+                </a:solidFill>
+                <a:latin typeface="Arial"/>
+              </a:rPr>
+              <a:t>Because we are only interested in </a:t>
+            </a:r>
+            <a:endParaRPr/>
+          </a:p>
+          <a:p>
+            <a:r>
+              <a:rPr b="1" lang="en-US" sz="2200">
+                <a:solidFill>
+                  <a:srgbClr val="9999ff"/>
+                </a:solidFill>
+                <a:latin typeface="Arial"/>
+              </a:rPr>
+              <a:t>activities that rarely happens. </a:t>
+            </a:r>
+            <a:endParaRPr/>
+          </a:p>
+          <a:p>
+            <a:r>
+              <a:rPr b="1" lang="en-US" sz="2200">
+                <a:solidFill>
+                  <a:srgbClr val="9999ff"/>
+                </a:solidFill>
+                <a:latin typeface="Arial"/>
+              </a:rPr>
+              <a:t>e.g. merging and bankruptcy of companies</a:t>
             </a:r>
             <a:endParaRPr/>
           </a:p>
@@ -13468,6 +14894,1007 @@
           <p:childTnLst>
             <p:seq>
               <p:cTn id="34" nodeType="mainSeq"/>
+              <p:prevCondLst>
+                <p:cond delay="0" evt="onPrev">
+                  <p:tgtEl>
+                    <p:sldTgt/>
+                  </p:tgtEl>
+                </p:cond>
+              </p:prevCondLst>
+              <p:nextCondLst>
+                <p:cond delay="0" evt="onNext">
+                  <p:tgtEl>
+                    <p:sldTgt/>
+                  </p:tgtEl>
+                </p:cond>
+              </p:nextCondLst>
+            </p:seq>
+          </p:childTnLst>
+        </p:cTn>
+      </p:par>
+    </p:tnLst>
+  </p:timing>
+</p:sld>
+</file>
+
+<file path=ppt/slides/slide18.xml><?xml version="1.0" encoding="utf-8"?>
+<p:sld xmlns:a="http://schemas.openxmlformats.org/drawingml/2006/main" xmlns:p="http://schemas.openxmlformats.org/presentationml/2006/main" xmlns:r="http://schemas.openxmlformats.org/officeDocument/2006/relationships">
+  <p:cSld>
+    <p:spTree>
+      <p:nvGrpSpPr>
+        <p:cNvPr id="1" name=""/>
+        <p:cNvGrpSpPr/>
+        <p:nvPr/>
+      </p:nvGrpSpPr>
+      <p:grpSpPr>
+        <a:xfrm>
+          <a:off x="0" y="0"/>
+          <a:ext cx="0" cy="0"/>
+          <a:chOff x="0" y="0"/>
+          <a:chExt cx="0" cy="0"/>
+        </a:xfrm>
+      </p:grpSpPr>
+      <p:sp>
+        <p:nvSpPr>
+          <p:cNvPr id="442" name="TextShape 1"/>
+          <p:cNvSpPr txBox="1"/>
+          <p:nvPr/>
+        </p:nvSpPr>
+        <p:spPr>
+          <a:xfrm>
+            <a:off x="609480" y="277920"/>
+            <a:ext cx="10972440" cy="864720"/>
+          </a:xfrm>
+          <a:prstGeom prst="rect">
+            <a:avLst/>
+          </a:prstGeom>
+          <a:noFill/>
+          <a:ln w="9360">
+            <a:noFill/>
+          </a:ln>
+        </p:spPr>
+        <p:txBody>
+          <a:bodyPr/>
+          <a:p>
+            <a:pPr>
+              <a:lnSpc>
+                <a:spcPct val="100000"/>
+              </a:lnSpc>
+            </a:pPr>
+            <a:r>
+              <a:rPr lang="de-DE" sz="2800" strike="noStrike">
+                <a:solidFill>
+                  <a:srgbClr val="cc0000"/>
+                </a:solidFill>
+                <a:latin typeface="Calibri"/>
+              </a:rPr>
+              <a:t>Case Study 2: European Companies</a:t>
+            </a:r>
+            <a:endParaRPr/>
+          </a:p>
+        </p:txBody>
+      </p:sp>
+      <p:sp>
+        <p:nvSpPr>
+          <p:cNvPr id="443" name="TextShape 2"/>
+          <p:cNvSpPr txBox="1"/>
+          <p:nvPr/>
+        </p:nvSpPr>
+        <p:spPr>
+          <a:xfrm>
+            <a:off x="8727120" y="6400800"/>
+            <a:ext cx="2844360" cy="456840"/>
+          </a:xfrm>
+          <a:prstGeom prst="rect">
+            <a:avLst/>
+          </a:prstGeom>
+          <a:noFill/>
+          <a:ln w="9360">
+            <a:noFill/>
+          </a:ln>
+        </p:spPr>
+        <p:txBody>
+          <a:bodyPr anchor="b"/>
+          <a:p>
+            <a:endParaRPr/>
+          </a:p>
+        </p:txBody>
+      </p:sp>
+      <p:sp>
+        <p:nvSpPr>
+          <p:cNvPr id="444" name="TextShape 3"/>
+          <p:cNvSpPr txBox="1"/>
+          <p:nvPr/>
+        </p:nvSpPr>
+        <p:spPr>
+          <a:xfrm>
+            <a:off x="597240" y="6477120"/>
+            <a:ext cx="7467120" cy="380520"/>
+          </a:xfrm>
+          <a:prstGeom prst="rect">
+            <a:avLst/>
+          </a:prstGeom>
+          <a:noFill/>
+          <a:ln w="19080">
+            <a:solidFill>
+              <a:srgbClr val="4c6d80"/>
+            </a:solidFill>
+            <a:round/>
+          </a:ln>
+        </p:spPr>
+        <p:txBody>
+          <a:bodyPr lIns="90000" rIns="90000" tIns="45000" bIns="45000"/>
+          <a:p>
+            <a:pPr>
+              <a:lnSpc>
+                <a:spcPct val="100000"/>
+              </a:lnSpc>
+            </a:pPr>
+            <a:r>
+              <a:rPr lang="en-US" sz="1400" strike="noStrike">
+                <a:solidFill>
+                  <a:srgbClr val="000000"/>
+                </a:solidFill>
+                <a:latin typeface="Calibri"/>
+              </a:rPr>
+              <a:t>Present, Papers titlte</a:t>
+            </a:r>
+            <a:endParaRPr/>
+          </a:p>
+        </p:txBody>
+      </p:sp>
+      <p:pic>
+        <p:nvPicPr>
+          <p:cNvPr id="445" name="" descr=""/>
+          <p:cNvPicPr/>
+          <p:nvPr/>
+        </p:nvPicPr>
+        <p:blipFill>
+          <a:blip r:embed="rId1"/>
+          <a:srcRect l="322071" t="289941" r="-49534" b="740527"/>
+          <a:stretch/>
+        </p:blipFill>
+        <p:spPr>
+          <a:xfrm>
+            <a:off x="828000" y="1224000"/>
+            <a:ext cx="8064000" cy="4968000"/>
+          </a:xfrm>
+          <a:prstGeom prst="rect">
+            <a:avLst/>
+          </a:prstGeom>
+          <a:ln>
+            <a:noFill/>
+          </a:ln>
+        </p:spPr>
+      </p:pic>
+      <p:sp>
+        <p:nvSpPr>
+          <p:cNvPr id="446" name="CustomShape 4"/>
+          <p:cNvSpPr/>
+          <p:nvPr/>
+        </p:nvSpPr>
+        <p:spPr>
+          <a:xfrm rot="2700000">
+            <a:off x="2013120" y="1833480"/>
+            <a:ext cx="509760" cy="509760"/>
+          </a:xfrm>
+          <a:prstGeom prst="plus">
+            <a:avLst>
+              <a:gd name="adj" fmla="val 10019"/>
+            </a:avLst>
+          </a:prstGeom>
+          <a:solidFill>
+            <a:srgbClr val="ff3333"/>
+          </a:solidFill>
+          <a:ln>
+            <a:solidFill>
+              <a:srgbClr val="ff3333"/>
+            </a:solidFill>
+          </a:ln>
+        </p:spPr>
+        <p:style>
+          <a:lnRef idx="0"/>
+          <a:fillRef idx="0"/>
+          <a:effectRef idx="0"/>
+          <a:fontRef idx="minor"/>
+        </p:style>
+      </p:sp>
+      <p:sp>
+        <p:nvSpPr>
+          <p:cNvPr id="447" name="CustomShape 5"/>
+          <p:cNvSpPr/>
+          <p:nvPr/>
+        </p:nvSpPr>
+        <p:spPr>
+          <a:xfrm rot="2700000">
+            <a:off x="1725120" y="2408400"/>
+            <a:ext cx="509760" cy="509760"/>
+          </a:xfrm>
+          <a:prstGeom prst="plus">
+            <a:avLst>
+              <a:gd name="adj" fmla="val 10019"/>
+            </a:avLst>
+          </a:prstGeom>
+          <a:solidFill>
+            <a:srgbClr val="ff3333"/>
+          </a:solidFill>
+          <a:ln>
+            <a:solidFill>
+              <a:srgbClr val="ff3333"/>
+            </a:solidFill>
+          </a:ln>
+        </p:spPr>
+        <p:style>
+          <a:lnRef idx="0"/>
+          <a:fillRef idx="0"/>
+          <a:effectRef idx="0"/>
+          <a:fontRef idx="minor"/>
+        </p:style>
+      </p:sp>
+      <p:sp>
+        <p:nvSpPr>
+          <p:cNvPr id="448" name="CustomShape 6"/>
+          <p:cNvSpPr/>
+          <p:nvPr/>
+        </p:nvSpPr>
+        <p:spPr>
+          <a:xfrm rot="2700000">
+            <a:off x="5684400" y="4497480"/>
+            <a:ext cx="509760" cy="509760"/>
+          </a:xfrm>
+          <a:prstGeom prst="plus">
+            <a:avLst>
+              <a:gd name="adj" fmla="val 10019"/>
+            </a:avLst>
+          </a:prstGeom>
+          <a:solidFill>
+            <a:srgbClr val="ff3333"/>
+          </a:solidFill>
+          <a:ln>
+            <a:solidFill>
+              <a:srgbClr val="ff3333"/>
+            </a:solidFill>
+          </a:ln>
+        </p:spPr>
+        <p:style>
+          <a:lnRef idx="0"/>
+          <a:fillRef idx="0"/>
+          <a:effectRef idx="0"/>
+          <a:fontRef idx="minor"/>
+        </p:style>
+      </p:sp>
+      <p:sp>
+        <p:nvSpPr>
+          <p:cNvPr id="449" name="CustomShape 7"/>
+          <p:cNvSpPr/>
+          <p:nvPr/>
+        </p:nvSpPr>
+        <p:spPr>
+          <a:xfrm rot="2700000">
+            <a:off x="5180400" y="4569480"/>
+            <a:ext cx="509760" cy="509760"/>
+          </a:xfrm>
+          <a:prstGeom prst="plus">
+            <a:avLst>
+              <a:gd name="adj" fmla="val 10019"/>
+            </a:avLst>
+          </a:prstGeom>
+          <a:solidFill>
+            <a:srgbClr val="ff3333"/>
+          </a:solidFill>
+          <a:ln>
+            <a:solidFill>
+              <a:srgbClr val="ff3333"/>
+            </a:solidFill>
+          </a:ln>
+        </p:spPr>
+        <p:style>
+          <a:lnRef idx="0"/>
+          <a:fillRef idx="0"/>
+          <a:effectRef idx="0"/>
+          <a:fontRef idx="minor"/>
+        </p:style>
+      </p:sp>
+      <p:sp>
+        <p:nvSpPr>
+          <p:cNvPr id="450" name="CustomShape 8"/>
+          <p:cNvSpPr/>
+          <p:nvPr/>
+        </p:nvSpPr>
+        <p:spPr>
+          <a:xfrm rot="2700000">
+            <a:off x="5468400" y="3705480"/>
+            <a:ext cx="509760" cy="509760"/>
+          </a:xfrm>
+          <a:prstGeom prst="plus">
+            <a:avLst>
+              <a:gd name="adj" fmla="val 10019"/>
+            </a:avLst>
+          </a:prstGeom>
+          <a:solidFill>
+            <a:srgbClr val="ff3333"/>
+          </a:solidFill>
+          <a:ln>
+            <a:solidFill>
+              <a:srgbClr val="ff3333"/>
+            </a:solidFill>
+          </a:ln>
+        </p:spPr>
+        <p:style>
+          <a:lnRef idx="0"/>
+          <a:fillRef idx="0"/>
+          <a:effectRef idx="0"/>
+          <a:fontRef idx="minor"/>
+        </p:style>
+      </p:sp>
+      <p:sp>
+        <p:nvSpPr>
+          <p:cNvPr id="451" name="CustomShape 9"/>
+          <p:cNvSpPr/>
+          <p:nvPr/>
+        </p:nvSpPr>
+        <p:spPr>
+          <a:xfrm rot="2700000">
+            <a:off x="5180400" y="3416400"/>
+            <a:ext cx="509760" cy="509760"/>
+          </a:xfrm>
+          <a:prstGeom prst="plus">
+            <a:avLst>
+              <a:gd name="adj" fmla="val 10019"/>
+            </a:avLst>
+          </a:prstGeom>
+          <a:solidFill>
+            <a:srgbClr val="ff3333"/>
+          </a:solidFill>
+          <a:ln>
+            <a:solidFill>
+              <a:srgbClr val="ff3333"/>
+            </a:solidFill>
+          </a:ln>
+        </p:spPr>
+        <p:style>
+          <a:lnRef idx="0"/>
+          <a:fillRef idx="0"/>
+          <a:effectRef idx="0"/>
+          <a:fontRef idx="minor"/>
+        </p:style>
+      </p:sp>
+      <p:sp>
+        <p:nvSpPr>
+          <p:cNvPr id="452" name="CustomShape 10"/>
+          <p:cNvSpPr/>
+          <p:nvPr/>
+        </p:nvSpPr>
+        <p:spPr>
+          <a:xfrm rot="2700000">
+            <a:off x="2624400" y="2912400"/>
+            <a:ext cx="509760" cy="509760"/>
+          </a:xfrm>
+          <a:prstGeom prst="plus">
+            <a:avLst>
+              <a:gd name="adj" fmla="val 10019"/>
+            </a:avLst>
+          </a:prstGeom>
+          <a:solidFill>
+            <a:srgbClr val="ff3333"/>
+          </a:solidFill>
+          <a:ln>
+            <a:solidFill>
+              <a:srgbClr val="ff3333"/>
+            </a:solidFill>
+          </a:ln>
+        </p:spPr>
+        <p:style>
+          <a:lnRef idx="0"/>
+          <a:fillRef idx="0"/>
+          <a:effectRef idx="0"/>
+          <a:fontRef idx="minor"/>
+        </p:style>
+      </p:sp>
+      <p:sp>
+        <p:nvSpPr>
+          <p:cNvPr id="453" name="CustomShape 11"/>
+          <p:cNvSpPr/>
+          <p:nvPr/>
+        </p:nvSpPr>
+        <p:spPr>
+          <a:xfrm rot="2700000">
+            <a:off x="6009120" y="1616400"/>
+            <a:ext cx="509760" cy="509760"/>
+          </a:xfrm>
+          <a:prstGeom prst="plus">
+            <a:avLst>
+              <a:gd name="adj" fmla="val 10019"/>
+            </a:avLst>
+          </a:prstGeom>
+          <a:solidFill>
+            <a:srgbClr val="ff3333"/>
+          </a:solidFill>
+          <a:ln>
+            <a:solidFill>
+              <a:srgbClr val="ff3333"/>
+            </a:solidFill>
+          </a:ln>
+        </p:spPr>
+        <p:style>
+          <a:lnRef idx="0"/>
+          <a:fillRef idx="0"/>
+          <a:effectRef idx="0"/>
+          <a:fontRef idx="minor"/>
+        </p:style>
+      </p:sp>
+      <p:sp>
+        <p:nvSpPr>
+          <p:cNvPr id="454" name="CustomShape 12"/>
+          <p:cNvSpPr/>
+          <p:nvPr/>
+        </p:nvSpPr>
+        <p:spPr>
+          <a:xfrm rot="2700000">
+            <a:off x="6513120" y="1905480"/>
+            <a:ext cx="509760" cy="509760"/>
+          </a:xfrm>
+          <a:prstGeom prst="plus">
+            <a:avLst>
+              <a:gd name="adj" fmla="val 10019"/>
+            </a:avLst>
+          </a:prstGeom>
+          <a:solidFill>
+            <a:srgbClr val="ff3333"/>
+          </a:solidFill>
+          <a:ln>
+            <a:solidFill>
+              <a:srgbClr val="ff3333"/>
+            </a:solidFill>
+          </a:ln>
+        </p:spPr>
+        <p:style>
+          <a:lnRef idx="0"/>
+          <a:fillRef idx="0"/>
+          <a:effectRef idx="0"/>
+          <a:fontRef idx="minor"/>
+        </p:style>
+      </p:sp>
+      <p:sp>
+        <p:nvSpPr>
+          <p:cNvPr id="455" name="CustomShape 13"/>
+          <p:cNvSpPr/>
+          <p:nvPr/>
+        </p:nvSpPr>
+        <p:spPr>
+          <a:xfrm rot="2700000">
+            <a:off x="5433120" y="2769480"/>
+            <a:ext cx="509760" cy="509760"/>
+          </a:xfrm>
+          <a:prstGeom prst="plus">
+            <a:avLst>
+              <a:gd name="adj" fmla="val 10019"/>
+            </a:avLst>
+          </a:prstGeom>
+          <a:solidFill>
+            <a:srgbClr val="ff3333"/>
+          </a:solidFill>
+          <a:ln>
+            <a:solidFill>
+              <a:srgbClr val="ff3333"/>
+            </a:solidFill>
+          </a:ln>
+        </p:spPr>
+        <p:style>
+          <a:lnRef idx="0"/>
+          <a:fillRef idx="0"/>
+          <a:effectRef idx="0"/>
+          <a:fontRef idx="minor"/>
+        </p:style>
+      </p:sp>
+      <p:sp>
+        <p:nvSpPr>
+          <p:cNvPr id="456" name="Line 14"/>
+          <p:cNvSpPr/>
+          <p:nvPr/>
+        </p:nvSpPr>
+        <p:spPr>
+          <a:xfrm flipH="1" flipV="1">
+            <a:off x="5904000" y="2196000"/>
+            <a:ext cx="3204000" cy="864000"/>
+          </a:xfrm>
+          <a:prstGeom prst="line">
+            <a:avLst/>
+          </a:prstGeom>
+          <a:ln w="38160">
+            <a:solidFill>
+              <a:srgbClr val="00ccff"/>
+            </a:solidFill>
+            <a:custDash>
+              <a:ds d="100000" sp="400000"/>
+            </a:custDash>
+            <a:round/>
+            <a:tailEnd len="med" type="triangle" w="med"/>
+          </a:ln>
+        </p:spPr>
+      </p:sp>
+      <p:sp>
+        <p:nvSpPr>
+          <p:cNvPr id="457" name="TextShape 15"/>
+          <p:cNvSpPr txBox="1"/>
+          <p:nvPr/>
+        </p:nvSpPr>
+        <p:spPr>
+          <a:xfrm>
+            <a:off x="9108000" y="3060000"/>
+            <a:ext cx="2959560" cy="3182400"/>
+          </a:xfrm>
+          <a:prstGeom prst="rect">
+            <a:avLst/>
+          </a:prstGeom>
+          <a:noFill/>
+          <a:ln w="57240">
+            <a:solidFill>
+              <a:srgbClr val="00ccff"/>
+            </a:solidFill>
+            <a:custDash>
+              <a:ds d="100000" sp="200000"/>
+            </a:custDash>
+            <a:round/>
+          </a:ln>
+        </p:spPr>
+        <p:txBody>
+          <a:bodyPr lIns="112320" rIns="112320" tIns="67320" bIns="67320"/>
+          <a:p>
+            <a:pPr algn="ctr"/>
+            <a:r>
+              <a:rPr b="1" lang="en-US" sz="2200">
+                <a:solidFill>
+                  <a:srgbClr val="00ccff"/>
+                </a:solidFill>
+                <a:latin typeface="Arial"/>
+              </a:rPr>
+              <a:t>Maintained because </a:t>
+            </a:r>
+            <a:endParaRPr/>
+          </a:p>
+          <a:p>
+            <a:pPr algn="ctr"/>
+            <a:endParaRPr/>
+          </a:p>
+          <a:p>
+            <a:pPr algn="ctr"/>
+            <a:r>
+              <a:rPr b="1" lang="en-US" sz="2200">
+                <a:solidFill>
+                  <a:srgbClr val="00ccff"/>
+                </a:solidFill>
+                <a:latin typeface="Arial"/>
+              </a:rPr>
+              <a:t>edge weight </a:t>
+            </a:r>
+            <a:endParaRPr/>
+          </a:p>
+          <a:p>
+            <a:pPr algn="ctr"/>
+            <a:endParaRPr/>
+          </a:p>
+          <a:p>
+            <a:pPr algn="ctr"/>
+            <a:r>
+              <a:rPr b="1" lang="en-US" sz="2200">
+                <a:solidFill>
+                  <a:srgbClr val="00ccff"/>
+                </a:solidFill>
+                <a:latin typeface="Arial"/>
+              </a:rPr>
+              <a:t>lower than </a:t>
+            </a:r>
+            <a:endParaRPr/>
+          </a:p>
+          <a:p>
+            <a:pPr algn="ctr"/>
+            <a:endParaRPr/>
+          </a:p>
+          <a:p>
+            <a:pPr algn="ctr"/>
+            <a:r>
+              <a:rPr b="1" lang="en-US" sz="2200">
+                <a:solidFill>
+                  <a:srgbClr val="00ccff"/>
+                </a:solidFill>
+                <a:latin typeface="Arial"/>
+              </a:rPr>
+              <a:t>some threshold</a:t>
+            </a:r>
+            <a:endParaRPr/>
+          </a:p>
+          <a:p>
+            <a:pPr algn="ctr"/>
+            <a:r>
+              <a:rPr b="1" lang="en-US" sz="2600">
+                <a:solidFill>
+                  <a:srgbClr val="00ccff"/>
+                </a:solidFill>
+                <a:latin typeface="Arial"/>
+              </a:rPr>
+              <a:t>*</a:t>
+            </a:r>
+            <a:endParaRPr/>
+          </a:p>
+          <a:p>
+            <a:pPr algn="ctr"/>
+            <a:r>
+              <a:rPr b="1" lang="en-US" sz="2200">
+                <a:solidFill>
+                  <a:srgbClr val="00ccff"/>
+                </a:solidFill>
+                <a:latin typeface="Arial"/>
+              </a:rPr>
+              <a:t>expected probability</a:t>
+            </a:r>
+            <a:endParaRPr/>
+          </a:p>
+          <a:p>
+            <a:pPr algn="ctr"/>
+            <a:endParaRPr/>
+          </a:p>
+        </p:txBody>
+      </p:sp>
+    </p:spTree>
+  </p:cSld>
+  <p:timing>
+    <p:tnLst>
+      <p:par>
+        <p:cTn id="35" dur="indefinite" restart="never" nodeType="tmRoot">
+          <p:childTnLst>
+            <p:seq>
+              <p:cTn id="36" nodeType="mainSeq"/>
+              <p:prevCondLst>
+                <p:cond delay="0" evt="onPrev">
+                  <p:tgtEl>
+                    <p:sldTgt/>
+                  </p:tgtEl>
+                </p:cond>
+              </p:prevCondLst>
+              <p:nextCondLst>
+                <p:cond delay="0" evt="onNext">
+                  <p:tgtEl>
+                    <p:sldTgt/>
+                  </p:tgtEl>
+                </p:cond>
+              </p:nextCondLst>
+            </p:seq>
+          </p:childTnLst>
+        </p:cTn>
+      </p:par>
+    </p:tnLst>
+  </p:timing>
+</p:sld>
+</file>
+
+<file path=ppt/slides/slide19.xml><?xml version="1.0" encoding="utf-8"?>
+<p:sld xmlns:a="http://schemas.openxmlformats.org/drawingml/2006/main" xmlns:p="http://schemas.openxmlformats.org/presentationml/2006/main" xmlns:r="http://schemas.openxmlformats.org/officeDocument/2006/relationships">
+  <p:cSld>
+    <p:spTree>
+      <p:nvGrpSpPr>
+        <p:cNvPr id="1" name=""/>
+        <p:cNvGrpSpPr/>
+        <p:nvPr/>
+      </p:nvGrpSpPr>
+      <p:grpSpPr>
+        <a:xfrm>
+          <a:off x="0" y="0"/>
+          <a:ext cx="0" cy="0"/>
+          <a:chOff x="0" y="0"/>
+          <a:chExt cx="0" cy="0"/>
+        </a:xfrm>
+      </p:grpSpPr>
+      <p:sp>
+        <p:nvSpPr>
+          <p:cNvPr id="458" name="TextShape 1"/>
+          <p:cNvSpPr txBox="1"/>
+          <p:nvPr/>
+        </p:nvSpPr>
+        <p:spPr>
+          <a:xfrm>
+            <a:off x="609480" y="277920"/>
+            <a:ext cx="10972440" cy="864720"/>
+          </a:xfrm>
+          <a:prstGeom prst="rect">
+            <a:avLst/>
+          </a:prstGeom>
+          <a:noFill/>
+          <a:ln w="9360">
+            <a:noFill/>
+          </a:ln>
+        </p:spPr>
+        <p:txBody>
+          <a:bodyPr/>
+          <a:p>
+            <a:pPr>
+              <a:lnSpc>
+                <a:spcPct val="100000"/>
+              </a:lnSpc>
+            </a:pPr>
+            <a:r>
+              <a:rPr lang="de-DE" sz="2800" strike="noStrike">
+                <a:solidFill>
+                  <a:srgbClr val="cc0000"/>
+                </a:solidFill>
+                <a:latin typeface="Calibri"/>
+              </a:rPr>
+              <a:t>One Step Further</a:t>
+            </a:r>
+            <a:endParaRPr/>
+          </a:p>
+        </p:txBody>
+      </p:sp>
+      <p:sp>
+        <p:nvSpPr>
+          <p:cNvPr id="459" name="TextShape 2"/>
+          <p:cNvSpPr txBox="1"/>
+          <p:nvPr/>
+        </p:nvSpPr>
+        <p:spPr>
+          <a:xfrm>
+            <a:off x="609480" y="1295280"/>
+            <a:ext cx="10972440" cy="5105160"/>
+          </a:xfrm>
+          <a:prstGeom prst="rect">
+            <a:avLst/>
+          </a:prstGeom>
+          <a:noFill/>
+          <a:ln w="9360">
+            <a:noFill/>
+          </a:ln>
+        </p:spPr>
+        <p:txBody>
+          <a:bodyPr/>
+          <a:p>
+            <a:pPr>
+              <a:lnSpc>
+                <a:spcPct val="100000"/>
+              </a:lnSpc>
+              <a:buSzPct val="65000"/>
+              <a:buFont typeface="Wingdings" charset="2"/>
+              <a:buChar char=""/>
+            </a:pPr>
+            <a:r>
+              <a:rPr lang="de-DE" sz="2800" strike="noStrike">
+                <a:solidFill>
+                  <a:srgbClr val="808080"/>
+                </a:solidFill>
+                <a:latin typeface="Calibri"/>
+              </a:rPr>
+              <a:t>Fuzzy Clustering...</a:t>
+            </a:r>
+            <a:endParaRPr/>
+          </a:p>
+          <a:p>
+            <a:pPr>
+              <a:lnSpc>
+                <a:spcPct val="100000"/>
+              </a:lnSpc>
+            </a:pPr>
+            <a:r>
+              <a:rPr lang="de-DE" sz="2800" strike="noStrike">
+                <a:solidFill>
+                  <a:srgbClr val="808080"/>
+                </a:solidFill>
+                <a:latin typeface="Calibri"/>
+              </a:rPr>
+              <a:t>for the formuler:</a:t>
+            </a:r>
+            <a:endParaRPr/>
+          </a:p>
+          <a:p>
+            <a:pPr>
+              <a:lnSpc>
+                <a:spcPct val="100000"/>
+              </a:lnSpc>
+            </a:pPr>
+            <a:endParaRPr/>
+          </a:p>
+          <a:p>
+            <a:pPr>
+              <a:lnSpc>
+                <a:spcPct val="100000"/>
+              </a:lnSpc>
+            </a:pPr>
+            <a:endParaRPr/>
+          </a:p>
+          <a:p>
+            <a:pPr>
+              <a:lnSpc>
+                <a:spcPct val="100000"/>
+              </a:lnSpc>
+            </a:pPr>
+            <a:r>
+              <a:rPr lang="de-DE" sz="2800" strike="noStrike">
+                <a:solidFill>
+                  <a:srgbClr val="808080"/>
+                </a:solidFill>
+                <a:latin typeface="Calibri"/>
+              </a:rPr>
+              <a:t>re-define the defination of </a:t>
+            </a:r>
+            <a:r>
+              <a:rPr i="1" lang="de-DE" sz="2800" strike="noStrike">
+                <a:solidFill>
+                  <a:srgbClr val="000000"/>
+                </a:solidFill>
+                <a:latin typeface="Calibri"/>
+              </a:rPr>
+              <a:t>intersection </a:t>
+            </a:r>
+            <a:r>
+              <a:rPr lang="de-DE" sz="2800" strike="noStrike">
+                <a:solidFill>
+                  <a:srgbClr val="808080"/>
+                </a:solidFill>
+                <a:latin typeface="Calibri"/>
+              </a:rPr>
+              <a:t>and</a:t>
+            </a:r>
+            <a:r>
+              <a:rPr lang="de-DE" sz="2800" strike="noStrike">
+                <a:solidFill>
+                  <a:srgbClr val="000000"/>
+                </a:solidFill>
+                <a:latin typeface="Calibri"/>
+              </a:rPr>
+              <a:t> </a:t>
+            </a:r>
+            <a:r>
+              <a:rPr i="1" lang="de-DE" sz="2800" strike="noStrike">
+                <a:solidFill>
+                  <a:srgbClr val="000000"/>
+                </a:solidFill>
+                <a:latin typeface="Calibri"/>
+              </a:rPr>
+              <a:t>join</a:t>
+            </a:r>
+            <a:r>
+              <a:rPr lang="de-DE" sz="2800" strike="noStrike">
+                <a:solidFill>
+                  <a:srgbClr val="808080"/>
+                </a:solidFill>
+                <a:latin typeface="Calibri"/>
+              </a:rPr>
+              <a:t>, as such:</a:t>
+            </a:r>
+            <a:endParaRPr/>
+          </a:p>
+          <a:p>
+            <a:pPr>
+              <a:lnSpc>
+                <a:spcPct val="100000"/>
+              </a:lnSpc>
+            </a:pPr>
+            <a:endParaRPr/>
+          </a:p>
+        </p:txBody>
+      </p:sp>
+      <p:sp>
+        <p:nvSpPr>
+          <p:cNvPr id="460" name="TextShape 3"/>
+          <p:cNvSpPr txBox="1"/>
+          <p:nvPr/>
+        </p:nvSpPr>
+        <p:spPr>
+          <a:xfrm>
+            <a:off x="8727120" y="6400800"/>
+            <a:ext cx="2844360" cy="456840"/>
+          </a:xfrm>
+          <a:prstGeom prst="rect">
+            <a:avLst/>
+          </a:prstGeom>
+          <a:noFill/>
+          <a:ln w="9360">
+            <a:noFill/>
+          </a:ln>
+        </p:spPr>
+        <p:txBody>
+          <a:bodyPr anchor="b"/>
+          <a:p>
+            <a:endParaRPr/>
+          </a:p>
+        </p:txBody>
+      </p:sp>
+      <p:sp>
+        <p:nvSpPr>
+          <p:cNvPr id="461" name="TextShape 4"/>
+          <p:cNvSpPr txBox="1"/>
+          <p:nvPr/>
+        </p:nvSpPr>
+        <p:spPr>
+          <a:xfrm>
+            <a:off x="597240" y="6477120"/>
+            <a:ext cx="7467120" cy="380520"/>
+          </a:xfrm>
+          <a:prstGeom prst="rect">
+            <a:avLst/>
+          </a:prstGeom>
+          <a:noFill/>
+          <a:ln w="19080">
+            <a:solidFill>
+              <a:srgbClr val="4c6d80"/>
+            </a:solidFill>
+            <a:round/>
+          </a:ln>
+        </p:spPr>
+        <p:txBody>
+          <a:bodyPr lIns="90000" rIns="90000" tIns="45000" bIns="45000"/>
+          <a:p>
+            <a:pPr>
+              <a:lnSpc>
+                <a:spcPct val="100000"/>
+              </a:lnSpc>
+            </a:pPr>
+            <a:r>
+              <a:rPr lang="en-US" sz="1400" strike="noStrike">
+                <a:solidFill>
+                  <a:srgbClr val="000000"/>
+                </a:solidFill>
+                <a:latin typeface="Calibri"/>
+              </a:rPr>
+              <a:t>Present, Papers titlte</a:t>
+            </a:r>
+            <a:endParaRPr/>
+          </a:p>
+        </p:txBody>
+      </p:sp>
+      <p:pic>
+        <p:nvPicPr>
+          <p:cNvPr id="462" name="" descr=""/>
+          <p:cNvPicPr/>
+          <p:nvPr/>
+        </p:nvPicPr>
+        <p:blipFill>
+          <a:blip r:embed="rId1"/>
+          <a:stretch/>
+        </p:blipFill>
+        <p:spPr>
+          <a:xfrm>
+            <a:off x="704160" y="2577600"/>
+            <a:ext cx="10765800" cy="940320"/>
+          </a:xfrm>
+          <a:prstGeom prst="rect">
+            <a:avLst/>
+          </a:prstGeom>
+          <a:ln>
+            <a:noFill/>
+          </a:ln>
+        </p:spPr>
+      </p:pic>
+      <p:pic>
+        <p:nvPicPr>
+          <p:cNvPr id="463" name="" descr=""/>
+          <p:cNvPicPr/>
+          <p:nvPr/>
+        </p:nvPicPr>
+        <p:blipFill>
+          <a:blip r:embed="rId2"/>
+          <a:stretch/>
+        </p:blipFill>
+        <p:spPr>
+          <a:xfrm>
+            <a:off x="4217040" y="4660920"/>
+            <a:ext cx="3961800" cy="1104840"/>
+          </a:xfrm>
+          <a:prstGeom prst="rect">
+            <a:avLst/>
+          </a:prstGeom>
+          <a:ln>
+            <a:noFill/>
+          </a:ln>
+        </p:spPr>
+      </p:pic>
+    </p:spTree>
+  </p:cSld>
+  <p:timing>
+    <p:tnLst>
+      <p:par>
+        <p:cTn id="37" dur="indefinite" restart="never" nodeType="tmRoot">
+          <p:childTnLst>
+            <p:seq>
+              <p:cTn id="38" nodeType="mainSeq"/>
               <p:prevCondLst>
                 <p:cond delay="0" evt="onPrev">
                   <p:tgtEl>
@@ -13833,6 +16260,246 @@
           <p:childTnLst>
             <p:seq>
               <p:cTn id="4" nodeType="mainSeq"/>
+              <p:prevCondLst>
+                <p:cond delay="0" evt="onPrev">
+                  <p:tgtEl>
+                    <p:sldTgt/>
+                  </p:tgtEl>
+                </p:cond>
+              </p:prevCondLst>
+              <p:nextCondLst>
+                <p:cond delay="0" evt="onNext">
+                  <p:tgtEl>
+                    <p:sldTgt/>
+                  </p:tgtEl>
+                </p:cond>
+              </p:nextCondLst>
+            </p:seq>
+          </p:childTnLst>
+        </p:cTn>
+      </p:par>
+    </p:tnLst>
+  </p:timing>
+</p:sld>
+</file>
+
+<file path=ppt/slides/slide20.xml><?xml version="1.0" encoding="utf-8"?>
+<p:sld xmlns:a="http://schemas.openxmlformats.org/drawingml/2006/main" xmlns:p="http://schemas.openxmlformats.org/presentationml/2006/main" xmlns:r="http://schemas.openxmlformats.org/officeDocument/2006/relationships">
+  <p:cSld>
+    <p:spTree>
+      <p:nvGrpSpPr>
+        <p:cNvPr id="1" name=""/>
+        <p:cNvGrpSpPr/>
+        <p:nvPr/>
+      </p:nvGrpSpPr>
+      <p:grpSpPr>
+        <a:xfrm>
+          <a:off x="0" y="0"/>
+          <a:ext cx="0" cy="0"/>
+          <a:chOff x="0" y="0"/>
+          <a:chExt cx="0" cy="0"/>
+        </a:xfrm>
+      </p:grpSpPr>
+      <p:sp>
+        <p:nvSpPr>
+          <p:cNvPr id="464" name="TextShape 1"/>
+          <p:cNvSpPr txBox="1"/>
+          <p:nvPr/>
+        </p:nvSpPr>
+        <p:spPr>
+          <a:xfrm>
+            <a:off x="609480" y="277920"/>
+            <a:ext cx="10972440" cy="864720"/>
+          </a:xfrm>
+          <a:prstGeom prst="rect">
+            <a:avLst/>
+          </a:prstGeom>
+          <a:noFill/>
+          <a:ln w="9360">
+            <a:noFill/>
+          </a:ln>
+        </p:spPr>
+        <p:txBody>
+          <a:bodyPr/>
+          <a:p>
+            <a:pPr>
+              <a:lnSpc>
+                <a:spcPct val="100000"/>
+              </a:lnSpc>
+            </a:pPr>
+            <a:r>
+              <a:rPr lang="de-DE" sz="2800" strike="noStrike">
+                <a:solidFill>
+                  <a:srgbClr val="cc0000"/>
+                </a:solidFill>
+                <a:latin typeface="Calibri"/>
+              </a:rPr>
+              <a:t>Acknowledgement</a:t>
+            </a:r>
+            <a:endParaRPr/>
+          </a:p>
+        </p:txBody>
+      </p:sp>
+      <p:sp>
+        <p:nvSpPr>
+          <p:cNvPr id="465" name="TextShape 2"/>
+          <p:cNvSpPr txBox="1"/>
+          <p:nvPr/>
+        </p:nvSpPr>
+        <p:spPr>
+          <a:xfrm>
+            <a:off x="609480" y="1295280"/>
+            <a:ext cx="10972440" cy="5105160"/>
+          </a:xfrm>
+          <a:prstGeom prst="rect">
+            <a:avLst/>
+          </a:prstGeom>
+          <a:noFill/>
+          <a:ln w="9360">
+            <a:noFill/>
+          </a:ln>
+        </p:spPr>
+        <p:txBody>
+          <a:bodyPr/>
+          <a:p>
+            <a:pPr algn="ctr">
+              <a:lnSpc>
+                <a:spcPct val="100000"/>
+              </a:lnSpc>
+            </a:pPr>
+            <a:endParaRPr/>
+          </a:p>
+          <a:p>
+            <a:pPr algn="ctr">
+              <a:lnSpc>
+                <a:spcPct val="100000"/>
+              </a:lnSpc>
+            </a:pPr>
+            <a:r>
+              <a:rPr lang="de-DE" sz="3600" strike="noStrike">
+                <a:solidFill>
+                  <a:srgbClr val="000000"/>
+                </a:solidFill>
+                <a:latin typeface="Calibri"/>
+              </a:rPr>
+              <a:t>Thank you for your attention.</a:t>
+            </a:r>
+            <a:endParaRPr/>
+          </a:p>
+          <a:p>
+            <a:pPr algn="ctr">
+              <a:lnSpc>
+                <a:spcPct val="100000"/>
+              </a:lnSpc>
+            </a:pPr>
+            <a:r>
+              <a:rPr lang="de-DE" sz="3600" strike="noStrike">
+                <a:solidFill>
+                  <a:srgbClr val="000000"/>
+                </a:solidFill>
+                <a:latin typeface="Calibri"/>
+              </a:rPr>
+              <a:t>Feel free to raise questions to me.</a:t>
+            </a:r>
+            <a:endParaRPr/>
+          </a:p>
+          <a:p>
+            <a:pPr algn="ctr">
+              <a:lnSpc>
+                <a:spcPct val="100000"/>
+              </a:lnSpc>
+            </a:pPr>
+            <a:r>
+              <a:rPr lang="de-DE" sz="3600" strike="noStrike">
+                <a:solidFill>
+                  <a:srgbClr val="000000"/>
+                </a:solidFill>
+                <a:latin typeface="Calibri"/>
+              </a:rPr>
+              <a:t>Have fun in following presentations.</a:t>
+            </a:r>
+            <a:endParaRPr/>
+          </a:p>
+        </p:txBody>
+      </p:sp>
+      <p:sp>
+        <p:nvSpPr>
+          <p:cNvPr id="466" name="TextShape 3"/>
+          <p:cNvSpPr txBox="1"/>
+          <p:nvPr/>
+        </p:nvSpPr>
+        <p:spPr>
+          <a:xfrm>
+            <a:off x="8727120" y="6400800"/>
+            <a:ext cx="2844360" cy="456840"/>
+          </a:xfrm>
+          <a:prstGeom prst="rect">
+            <a:avLst/>
+          </a:prstGeom>
+          <a:noFill/>
+          <a:ln w="9360">
+            <a:noFill/>
+          </a:ln>
+        </p:spPr>
+        <p:txBody>
+          <a:bodyPr anchor="b"/>
+          <a:p>
+            <a:endParaRPr/>
+          </a:p>
+        </p:txBody>
+      </p:sp>
+      <p:sp>
+        <p:nvSpPr>
+          <p:cNvPr id="467" name="TextShape 4"/>
+          <p:cNvSpPr txBox="1"/>
+          <p:nvPr/>
+        </p:nvSpPr>
+        <p:spPr>
+          <a:xfrm>
+            <a:off x="597240" y="6477120"/>
+            <a:ext cx="7467120" cy="380520"/>
+          </a:xfrm>
+          <a:prstGeom prst="rect">
+            <a:avLst/>
+          </a:prstGeom>
+          <a:noFill/>
+          <a:ln w="19080">
+            <a:solidFill>
+              <a:srgbClr val="4c6d80"/>
+            </a:solidFill>
+            <a:round/>
+          </a:ln>
+        </p:spPr>
+        <p:txBody>
+          <a:bodyPr lIns="90000" rIns="90000" tIns="45000" bIns="45000"/>
+          <a:p>
+            <a:pPr>
+              <a:lnSpc>
+                <a:spcPct val="100000"/>
+              </a:lnSpc>
+            </a:pPr>
+            <a:r>
+              <a:rPr lang="en-US" sz="1400" strike="noStrike">
+                <a:solidFill>
+                  <a:srgbClr val="000000"/>
+                </a:solidFill>
+                <a:latin typeface="Calibri"/>
+              </a:rPr>
+              <a:t>Present, Papers titlte</a:t>
+            </a:r>
+            <a:endParaRPr/>
+          </a:p>
+        </p:txBody>
+      </p:sp>
+    </p:spTree>
+  </p:cSld>
+  <p:timing>
+    <p:tnLst>
+      <p:par>
+        <p:cTn id="39" dur="indefinite" restart="never" nodeType="tmRoot">
+          <p:childTnLst>
+            <p:seq>
+              <p:cTn id="40" nodeType="mainSeq"/>
               <p:prevCondLst>
                 <p:cond delay="0" evt="onPrev">
                   <p:tgtEl>

</xml_diff>